<commit_message>
Updated chapter 5 draft and added a new figure in dissertation_figures.pptx
</commit_message>
<xml_diff>
--- a/Documents/Dissertacao/dissertation_figures.pptx
+++ b/Documents/Dissertacao/dissertation_figures.pptx
@@ -18,6 +18,7 @@
     <p:sldId id="268" r:id="rId12"/>
     <p:sldId id="269" r:id="rId13"/>
     <p:sldId id="270" r:id="rId14"/>
+    <p:sldId id="271" r:id="rId15"/>
   </p:sldIdLst>
   <p:sldSz cx="9144000" cy="6858000" type="screen4x3"/>
   <p:notesSz cx="6858000" cy="9144000"/>
@@ -301,7 +302,7 @@
             <a:fld id="{331B0D56-BC31-4997-A5B4-54E7FF55EA8B}" type="datetimeFigureOut">
               <a:rPr lang="en-US" smtClean="0"/>
               <a:pPr/>
-              <a:t>5/1/2013</a:t>
+              <a:t>5/16/2013</a:t>
             </a:fld>
             <a:endParaRPr lang="en-US"/>
           </a:p>
@@ -468,7 +469,7 @@
             <a:fld id="{331B0D56-BC31-4997-A5B4-54E7FF55EA8B}" type="datetimeFigureOut">
               <a:rPr lang="en-US" smtClean="0"/>
               <a:pPr/>
-              <a:t>5/1/2013</a:t>
+              <a:t>5/16/2013</a:t>
             </a:fld>
             <a:endParaRPr lang="en-US"/>
           </a:p>
@@ -645,7 +646,7 @@
             <a:fld id="{331B0D56-BC31-4997-A5B4-54E7FF55EA8B}" type="datetimeFigureOut">
               <a:rPr lang="en-US" smtClean="0"/>
               <a:pPr/>
-              <a:t>5/1/2013</a:t>
+              <a:t>5/16/2013</a:t>
             </a:fld>
             <a:endParaRPr lang="en-US"/>
           </a:p>
@@ -812,7 +813,7 @@
             <a:fld id="{331B0D56-BC31-4997-A5B4-54E7FF55EA8B}" type="datetimeFigureOut">
               <a:rPr lang="en-US" smtClean="0"/>
               <a:pPr/>
-              <a:t>5/1/2013</a:t>
+              <a:t>5/16/2013</a:t>
             </a:fld>
             <a:endParaRPr lang="en-US"/>
           </a:p>
@@ -1055,7 +1056,7 @@
             <a:fld id="{331B0D56-BC31-4997-A5B4-54E7FF55EA8B}" type="datetimeFigureOut">
               <a:rPr lang="en-US" smtClean="0"/>
               <a:pPr/>
-              <a:t>5/1/2013</a:t>
+              <a:t>5/16/2013</a:t>
             </a:fld>
             <a:endParaRPr lang="en-US"/>
           </a:p>
@@ -1340,7 +1341,7 @@
             <a:fld id="{331B0D56-BC31-4997-A5B4-54E7FF55EA8B}" type="datetimeFigureOut">
               <a:rPr lang="en-US" smtClean="0"/>
               <a:pPr/>
-              <a:t>5/1/2013</a:t>
+              <a:t>5/16/2013</a:t>
             </a:fld>
             <a:endParaRPr lang="en-US"/>
           </a:p>
@@ -1759,7 +1760,7 @@
             <a:fld id="{331B0D56-BC31-4997-A5B4-54E7FF55EA8B}" type="datetimeFigureOut">
               <a:rPr lang="en-US" smtClean="0"/>
               <a:pPr/>
-              <a:t>5/1/2013</a:t>
+              <a:t>5/16/2013</a:t>
             </a:fld>
             <a:endParaRPr lang="en-US"/>
           </a:p>
@@ -1874,7 +1875,7 @@
             <a:fld id="{331B0D56-BC31-4997-A5B4-54E7FF55EA8B}" type="datetimeFigureOut">
               <a:rPr lang="en-US" smtClean="0"/>
               <a:pPr/>
-              <a:t>5/1/2013</a:t>
+              <a:t>5/16/2013</a:t>
             </a:fld>
             <a:endParaRPr lang="en-US"/>
           </a:p>
@@ -1966,7 +1967,7 @@
             <a:fld id="{331B0D56-BC31-4997-A5B4-54E7FF55EA8B}" type="datetimeFigureOut">
               <a:rPr lang="en-US" smtClean="0"/>
               <a:pPr/>
-              <a:t>5/1/2013</a:t>
+              <a:t>5/16/2013</a:t>
             </a:fld>
             <a:endParaRPr lang="en-US"/>
           </a:p>
@@ -2240,7 +2241,7 @@
             <a:fld id="{331B0D56-BC31-4997-A5B4-54E7FF55EA8B}" type="datetimeFigureOut">
               <a:rPr lang="en-US" smtClean="0"/>
               <a:pPr/>
-              <a:t>5/1/2013</a:t>
+              <a:t>5/16/2013</a:t>
             </a:fld>
             <a:endParaRPr lang="en-US"/>
           </a:p>
@@ -2490,7 +2491,7 @@
             <a:fld id="{331B0D56-BC31-4997-A5B4-54E7FF55EA8B}" type="datetimeFigureOut">
               <a:rPr lang="en-US" smtClean="0"/>
               <a:pPr/>
-              <a:t>5/1/2013</a:t>
+              <a:t>5/16/2013</a:t>
             </a:fld>
             <a:endParaRPr lang="en-US"/>
           </a:p>
@@ -2700,7 +2701,7 @@
             <a:fld id="{331B0D56-BC31-4997-A5B4-54E7FF55EA8B}" type="datetimeFigureOut">
               <a:rPr lang="en-US" smtClean="0"/>
               <a:pPr/>
-              <a:t>5/1/2013</a:t>
+              <a:t>5/16/2013</a:t>
             </a:fld>
             <a:endParaRPr lang="en-US"/>
           </a:p>
@@ -7292,6 +7293,1175 @@
             <a:r>
               <a:rPr lang="en-US" dirty="0" smtClean="0"/>
               <a:t>+ 9hp</a:t>
+            </a:r>
+            <a:endParaRPr lang="en-US" dirty="0"/>
+          </a:p>
+        </p:txBody>
+      </p:sp>
+    </p:spTree>
+  </p:cSld>
+  <p:clrMapOvr>
+    <a:masterClrMapping/>
+  </p:clrMapOvr>
+</p:sld>
+</file>
+
+<file path=ppt/slides/slide14.xml><?xml version="1.0" encoding="utf-8"?>
+<p:sld xmlns:a="http://schemas.openxmlformats.org/drawingml/2006/main" xmlns:r="http://schemas.openxmlformats.org/officeDocument/2006/relationships" xmlns:p="http://schemas.openxmlformats.org/presentationml/2006/main">
+  <p:cSld>
+    <p:spTree>
+      <p:nvGrpSpPr>
+        <p:cNvPr id="1" name=""/>
+        <p:cNvGrpSpPr/>
+        <p:nvPr/>
+      </p:nvGrpSpPr>
+      <p:grpSpPr>
+        <a:xfrm>
+          <a:off x="0" y="0"/>
+          <a:ext cx="0" cy="0"/>
+          <a:chOff x="0" y="0"/>
+          <a:chExt cx="0" cy="0"/>
+        </a:xfrm>
+      </p:grpSpPr>
+      <p:sp>
+        <p:nvSpPr>
+          <p:cNvPr id="100" name="Rounded Rectangle 99"/>
+          <p:cNvSpPr/>
+          <p:nvPr/>
+        </p:nvSpPr>
+        <p:spPr>
+          <a:xfrm>
+            <a:off x="5181600" y="2895600"/>
+            <a:ext cx="1295400" cy="1219200"/>
+          </a:xfrm>
+          <a:prstGeom prst="roundRect">
+            <a:avLst/>
+          </a:prstGeom>
+        </p:spPr>
+        <p:style>
+          <a:lnRef idx="2">
+            <a:schemeClr val="accent1"/>
+          </a:lnRef>
+          <a:fillRef idx="1">
+            <a:schemeClr val="lt1"/>
+          </a:fillRef>
+          <a:effectRef idx="0">
+            <a:schemeClr val="accent1"/>
+          </a:effectRef>
+          <a:fontRef idx="minor">
+            <a:schemeClr val="dk1"/>
+          </a:fontRef>
+        </p:style>
+        <p:txBody>
+          <a:bodyPr rtlCol="0" anchor="ctr"/>
+          <a:lstStyle/>
+          <a:p>
+            <a:pPr algn="ctr"/>
+            <a:endParaRPr lang="en-US"/>
+          </a:p>
+        </p:txBody>
+      </p:sp>
+      <p:sp>
+        <p:nvSpPr>
+          <p:cNvPr id="98" name="Rounded Rectangle 97"/>
+          <p:cNvSpPr/>
+          <p:nvPr/>
+        </p:nvSpPr>
+        <p:spPr>
+          <a:xfrm>
+            <a:off x="7010400" y="609600"/>
+            <a:ext cx="1828800" cy="3429000"/>
+          </a:xfrm>
+          <a:prstGeom prst="roundRect">
+            <a:avLst/>
+          </a:prstGeom>
+        </p:spPr>
+        <p:style>
+          <a:lnRef idx="2">
+            <a:schemeClr val="accent1"/>
+          </a:lnRef>
+          <a:fillRef idx="1">
+            <a:schemeClr val="lt1"/>
+          </a:fillRef>
+          <a:effectRef idx="0">
+            <a:schemeClr val="accent1"/>
+          </a:effectRef>
+          <a:fontRef idx="minor">
+            <a:schemeClr val="dk1"/>
+          </a:fontRef>
+        </p:style>
+        <p:txBody>
+          <a:bodyPr rtlCol="0" anchor="ctr"/>
+          <a:lstStyle/>
+          <a:p>
+            <a:pPr algn="ctr"/>
+            <a:endParaRPr lang="en-US"/>
+          </a:p>
+        </p:txBody>
+      </p:sp>
+      <p:sp>
+        <p:nvSpPr>
+          <p:cNvPr id="96" name="Rounded Rectangle 95"/>
+          <p:cNvSpPr/>
+          <p:nvPr/>
+        </p:nvSpPr>
+        <p:spPr>
+          <a:xfrm>
+            <a:off x="0" y="609600"/>
+            <a:ext cx="6477000" cy="2133600"/>
+          </a:xfrm>
+          <a:prstGeom prst="roundRect">
+            <a:avLst/>
+          </a:prstGeom>
+        </p:spPr>
+        <p:style>
+          <a:lnRef idx="2">
+            <a:schemeClr val="accent1"/>
+          </a:lnRef>
+          <a:fillRef idx="1">
+            <a:schemeClr val="lt1"/>
+          </a:fillRef>
+          <a:effectRef idx="0">
+            <a:schemeClr val="accent1"/>
+          </a:effectRef>
+          <a:fontRef idx="minor">
+            <a:schemeClr val="dk1"/>
+          </a:fontRef>
+        </p:style>
+        <p:txBody>
+          <a:bodyPr rtlCol="0" anchor="ctr"/>
+          <a:lstStyle/>
+          <a:p>
+            <a:pPr algn="ctr"/>
+            <a:endParaRPr lang="en-US" dirty="0"/>
+          </a:p>
+        </p:txBody>
+      </p:sp>
+      <p:sp>
+        <p:nvSpPr>
+          <p:cNvPr id="4" name="Flowchart: Document 3"/>
+          <p:cNvSpPr/>
+          <p:nvPr/>
+        </p:nvSpPr>
+        <p:spPr>
+          <a:xfrm>
+            <a:off x="152400" y="758952"/>
+            <a:ext cx="914400" cy="612648"/>
+          </a:xfrm>
+          <a:prstGeom prst="flowChartDocument">
+            <a:avLst/>
+          </a:prstGeom>
+        </p:spPr>
+        <p:style>
+          <a:lnRef idx="1">
+            <a:schemeClr val="accent1"/>
+          </a:lnRef>
+          <a:fillRef idx="2">
+            <a:schemeClr val="accent1"/>
+          </a:fillRef>
+          <a:effectRef idx="1">
+            <a:schemeClr val="accent1"/>
+          </a:effectRef>
+          <a:fontRef idx="minor">
+            <a:schemeClr val="dk1"/>
+          </a:fontRef>
+        </p:style>
+        <p:txBody>
+          <a:bodyPr rtlCol="0" anchor="ctr"/>
+          <a:lstStyle/>
+          <a:p>
+            <a:pPr algn="ctr"/>
+            <a:r>
+              <a:rPr lang="en-US" sz="1050" dirty="0" smtClean="0"/>
+              <a:t>Game Flow Log</a:t>
+            </a:r>
+            <a:endParaRPr lang="en-US" sz="1050" dirty="0"/>
+          </a:p>
+        </p:txBody>
+      </p:sp>
+      <p:sp>
+        <p:nvSpPr>
+          <p:cNvPr id="5" name="Flowchart: Process 4"/>
+          <p:cNvSpPr/>
+          <p:nvPr/>
+        </p:nvSpPr>
+        <p:spPr>
+          <a:xfrm>
+            <a:off x="152400" y="1524000"/>
+            <a:ext cx="914400" cy="612648"/>
+          </a:xfrm>
+          <a:prstGeom prst="flowChartProcess">
+            <a:avLst/>
+          </a:prstGeom>
+        </p:spPr>
+        <p:style>
+          <a:lnRef idx="1">
+            <a:schemeClr val="accent1"/>
+          </a:lnRef>
+          <a:fillRef idx="2">
+            <a:schemeClr val="accent1"/>
+          </a:fillRef>
+          <a:effectRef idx="1">
+            <a:schemeClr val="accent1"/>
+          </a:effectRef>
+          <a:fontRef idx="minor">
+            <a:schemeClr val="dk1"/>
+          </a:fontRef>
+        </p:style>
+        <p:txBody>
+          <a:bodyPr rtlCol="0" anchor="ctr"/>
+          <a:lstStyle/>
+          <a:p>
+            <a:pPr algn="ctr"/>
+            <a:r>
+              <a:rPr lang="en-US" sz="1050" dirty="0" smtClean="0"/>
+              <a:t>Get pair of vertices</a:t>
+            </a:r>
+            <a:endParaRPr lang="en-US" sz="1050" dirty="0"/>
+          </a:p>
+        </p:txBody>
+      </p:sp>
+      <p:cxnSp>
+        <p:nvCxnSpPr>
+          <p:cNvPr id="8" name="Straight Arrow Connector 7"/>
+          <p:cNvCxnSpPr>
+            <a:stCxn id="4" idx="2"/>
+            <a:endCxn id="5" idx="0"/>
+          </p:cNvCxnSpPr>
+          <p:nvPr/>
+        </p:nvCxnSpPr>
+        <p:spPr>
+          <a:xfrm>
+            <a:off x="609600" y="1331097"/>
+            <a:ext cx="0" cy="192903"/>
+          </a:xfrm>
+          <a:prstGeom prst="straightConnector1">
+            <a:avLst/>
+          </a:prstGeom>
+          <a:ln>
+            <a:tailEnd type="arrow"/>
+          </a:ln>
+        </p:spPr>
+        <p:style>
+          <a:lnRef idx="1">
+            <a:schemeClr val="accent1"/>
+          </a:lnRef>
+          <a:fillRef idx="2">
+            <a:schemeClr val="accent1"/>
+          </a:fillRef>
+          <a:effectRef idx="1">
+            <a:schemeClr val="accent1"/>
+          </a:effectRef>
+          <a:fontRef idx="minor">
+            <a:schemeClr val="dk1"/>
+          </a:fontRef>
+        </p:style>
+      </p:cxnSp>
+      <p:sp>
+        <p:nvSpPr>
+          <p:cNvPr id="9" name="Flowchart: Process 8"/>
+          <p:cNvSpPr/>
+          <p:nvPr/>
+        </p:nvSpPr>
+        <p:spPr>
+          <a:xfrm>
+            <a:off x="1447800" y="1524000"/>
+            <a:ext cx="914400" cy="612648"/>
+          </a:xfrm>
+          <a:prstGeom prst="flowChartProcess">
+            <a:avLst/>
+          </a:prstGeom>
+        </p:spPr>
+        <p:style>
+          <a:lnRef idx="1">
+            <a:schemeClr val="accent1"/>
+          </a:lnRef>
+          <a:fillRef idx="2">
+            <a:schemeClr val="accent1"/>
+          </a:fillRef>
+          <a:effectRef idx="1">
+            <a:schemeClr val="accent1"/>
+          </a:effectRef>
+          <a:fontRef idx="minor">
+            <a:schemeClr val="dk1"/>
+          </a:fontRef>
+        </p:style>
+        <p:txBody>
+          <a:bodyPr rtlCol="0" anchor="ctr"/>
+          <a:lstStyle/>
+          <a:p>
+            <a:pPr algn="ctr"/>
+            <a:r>
+              <a:rPr lang="en-US" sz="1050" dirty="0" smtClean="0"/>
+              <a:t>Generate Edge’s Vertices</a:t>
+            </a:r>
+            <a:endParaRPr lang="en-US" sz="1050" dirty="0"/>
+          </a:p>
+        </p:txBody>
+      </p:sp>
+      <p:sp>
+        <p:nvSpPr>
+          <p:cNvPr id="10" name="Flowchart: Process 9"/>
+          <p:cNvSpPr/>
+          <p:nvPr/>
+        </p:nvSpPr>
+        <p:spPr>
+          <a:xfrm>
+            <a:off x="2667000" y="1524000"/>
+            <a:ext cx="914400" cy="612648"/>
+          </a:xfrm>
+          <a:prstGeom prst="flowChartProcess">
+            <a:avLst/>
+          </a:prstGeom>
+        </p:spPr>
+        <p:style>
+          <a:lnRef idx="1">
+            <a:schemeClr val="accent1"/>
+          </a:lnRef>
+          <a:fillRef idx="2">
+            <a:schemeClr val="accent1"/>
+          </a:fillRef>
+          <a:effectRef idx="1">
+            <a:schemeClr val="accent1"/>
+          </a:effectRef>
+          <a:fontRef idx="minor">
+            <a:schemeClr val="dk1"/>
+          </a:fontRef>
+        </p:style>
+        <p:txBody>
+          <a:bodyPr rtlCol="0" anchor="ctr"/>
+          <a:lstStyle/>
+          <a:p>
+            <a:pPr algn="ctr"/>
+            <a:r>
+              <a:rPr lang="en-US" sz="1050" dirty="0" smtClean="0"/>
+              <a:t>Generate Edge</a:t>
+            </a:r>
+            <a:endParaRPr lang="en-US" sz="1050" dirty="0"/>
+          </a:p>
+        </p:txBody>
+      </p:sp>
+      <p:cxnSp>
+        <p:nvCxnSpPr>
+          <p:cNvPr id="14" name="Elbow Connector 13"/>
+          <p:cNvCxnSpPr>
+            <a:stCxn id="20" idx="2"/>
+            <a:endCxn id="5" idx="2"/>
+          </p:cNvCxnSpPr>
+          <p:nvPr/>
+        </p:nvCxnSpPr>
+        <p:spPr>
+          <a:xfrm rot="5400000">
+            <a:off x="3181350" y="-435102"/>
+            <a:ext cx="12700" cy="5143500"/>
+          </a:xfrm>
+          <a:prstGeom prst="bentConnector3">
+            <a:avLst>
+              <a:gd name="adj1" fmla="val 1800000"/>
+            </a:avLst>
+          </a:prstGeom>
+          <a:ln>
+            <a:tailEnd type="arrow"/>
+          </a:ln>
+        </p:spPr>
+        <p:style>
+          <a:lnRef idx="1">
+            <a:schemeClr val="accent1"/>
+          </a:lnRef>
+          <a:fillRef idx="2">
+            <a:schemeClr val="accent1"/>
+          </a:fillRef>
+          <a:effectRef idx="1">
+            <a:schemeClr val="accent1"/>
+          </a:effectRef>
+          <a:fontRef idx="minor">
+            <a:schemeClr val="dk1"/>
+          </a:fontRef>
+        </p:style>
+      </p:cxnSp>
+      <p:cxnSp>
+        <p:nvCxnSpPr>
+          <p:cNvPr id="17" name="Straight Arrow Connector 16"/>
+          <p:cNvCxnSpPr>
+            <a:stCxn id="5" idx="3"/>
+            <a:endCxn id="9" idx="1"/>
+          </p:cNvCxnSpPr>
+          <p:nvPr/>
+        </p:nvCxnSpPr>
+        <p:spPr>
+          <a:xfrm>
+            <a:off x="1066800" y="1830324"/>
+            <a:ext cx="381000" cy="0"/>
+          </a:xfrm>
+          <a:prstGeom prst="straightConnector1">
+            <a:avLst/>
+          </a:prstGeom>
+          <a:ln>
+            <a:tailEnd type="arrow"/>
+          </a:ln>
+        </p:spPr>
+        <p:style>
+          <a:lnRef idx="1">
+            <a:schemeClr val="accent1"/>
+          </a:lnRef>
+          <a:fillRef idx="2">
+            <a:schemeClr val="accent1"/>
+          </a:fillRef>
+          <a:effectRef idx="1">
+            <a:schemeClr val="accent1"/>
+          </a:effectRef>
+          <a:fontRef idx="minor">
+            <a:schemeClr val="dk1"/>
+          </a:fontRef>
+        </p:style>
+      </p:cxnSp>
+      <p:cxnSp>
+        <p:nvCxnSpPr>
+          <p:cNvPr id="19" name="Straight Arrow Connector 18"/>
+          <p:cNvCxnSpPr>
+            <a:stCxn id="9" idx="3"/>
+            <a:endCxn id="10" idx="1"/>
+          </p:cNvCxnSpPr>
+          <p:nvPr/>
+        </p:nvCxnSpPr>
+        <p:spPr>
+          <a:xfrm>
+            <a:off x="2362200" y="1830324"/>
+            <a:ext cx="304800" cy="0"/>
+          </a:xfrm>
+          <a:prstGeom prst="straightConnector1">
+            <a:avLst/>
+          </a:prstGeom>
+          <a:ln>
+            <a:tailEnd type="arrow"/>
+          </a:ln>
+        </p:spPr>
+        <p:style>
+          <a:lnRef idx="1">
+            <a:schemeClr val="accent1"/>
+          </a:lnRef>
+          <a:fillRef idx="2">
+            <a:schemeClr val="accent1"/>
+          </a:fillRef>
+          <a:effectRef idx="1">
+            <a:schemeClr val="accent1"/>
+          </a:effectRef>
+          <a:fontRef idx="minor">
+            <a:schemeClr val="dk1"/>
+          </a:fontRef>
+        </p:style>
+      </p:cxnSp>
+      <p:sp>
+        <p:nvSpPr>
+          <p:cNvPr id="20" name="Flowchart: Decision 19"/>
+          <p:cNvSpPr/>
+          <p:nvPr/>
+        </p:nvSpPr>
+        <p:spPr>
+          <a:xfrm>
+            <a:off x="5105400" y="1524000"/>
+            <a:ext cx="1295400" cy="612648"/>
+          </a:xfrm>
+          <a:prstGeom prst="flowChartDecision">
+            <a:avLst/>
+          </a:prstGeom>
+        </p:spPr>
+        <p:style>
+          <a:lnRef idx="1">
+            <a:schemeClr val="accent1"/>
+          </a:lnRef>
+          <a:fillRef idx="2">
+            <a:schemeClr val="accent1"/>
+          </a:fillRef>
+          <a:effectRef idx="1">
+            <a:schemeClr val="accent1"/>
+          </a:effectRef>
+          <a:fontRef idx="minor">
+            <a:schemeClr val="dk1"/>
+          </a:fontRef>
+        </p:style>
+        <p:txBody>
+          <a:bodyPr rtlCol="0" anchor="ctr"/>
+          <a:lstStyle/>
+          <a:p>
+            <a:pPr algn="ctr"/>
+            <a:r>
+              <a:rPr lang="en-US" sz="1050" dirty="0" smtClean="0"/>
+              <a:t>Finished?</a:t>
+            </a:r>
+            <a:endParaRPr lang="en-US" sz="1050" dirty="0"/>
+          </a:p>
+        </p:txBody>
+      </p:sp>
+      <p:cxnSp>
+        <p:nvCxnSpPr>
+          <p:cNvPr id="24" name="Straight Arrow Connector 23"/>
+          <p:cNvCxnSpPr>
+            <a:stCxn id="10" idx="3"/>
+            <a:endCxn id="29" idx="1"/>
+          </p:cNvCxnSpPr>
+          <p:nvPr/>
+        </p:nvCxnSpPr>
+        <p:spPr>
+          <a:xfrm>
+            <a:off x="3581400" y="1830324"/>
+            <a:ext cx="381000" cy="0"/>
+          </a:xfrm>
+          <a:prstGeom prst="straightConnector1">
+            <a:avLst/>
+          </a:prstGeom>
+          <a:ln>
+            <a:tailEnd type="arrow"/>
+          </a:ln>
+        </p:spPr>
+        <p:style>
+          <a:lnRef idx="1">
+            <a:schemeClr val="accent1"/>
+          </a:lnRef>
+          <a:fillRef idx="2">
+            <a:schemeClr val="accent1"/>
+          </a:fillRef>
+          <a:effectRef idx="1">
+            <a:schemeClr val="accent1"/>
+          </a:effectRef>
+          <a:fontRef idx="minor">
+            <a:schemeClr val="dk1"/>
+          </a:fontRef>
+        </p:style>
+      </p:cxnSp>
+      <p:sp>
+        <p:nvSpPr>
+          <p:cNvPr id="29" name="Flowchart: Process 28"/>
+          <p:cNvSpPr/>
+          <p:nvPr/>
+        </p:nvSpPr>
+        <p:spPr>
+          <a:xfrm>
+            <a:off x="3962400" y="1524000"/>
+            <a:ext cx="914400" cy="612648"/>
+          </a:xfrm>
+          <a:prstGeom prst="flowChartProcess">
+            <a:avLst/>
+          </a:prstGeom>
+        </p:spPr>
+        <p:style>
+          <a:lnRef idx="1">
+            <a:schemeClr val="accent1"/>
+          </a:lnRef>
+          <a:fillRef idx="2">
+            <a:schemeClr val="accent1"/>
+          </a:fillRef>
+          <a:effectRef idx="1">
+            <a:schemeClr val="accent1"/>
+          </a:effectRef>
+          <a:fontRef idx="minor">
+            <a:schemeClr val="dk1"/>
+          </a:fontRef>
+        </p:style>
+        <p:txBody>
+          <a:bodyPr rtlCol="0" anchor="ctr"/>
+          <a:lstStyle/>
+          <a:p>
+            <a:pPr algn="ctr"/>
+            <a:r>
+              <a:rPr lang="en-US" sz="1050" dirty="0" smtClean="0"/>
+              <a:t>Add Edge to the list</a:t>
+            </a:r>
+            <a:endParaRPr lang="en-US" sz="1050" dirty="0"/>
+          </a:p>
+        </p:txBody>
+      </p:sp>
+      <p:cxnSp>
+        <p:nvCxnSpPr>
+          <p:cNvPr id="35" name="Straight Arrow Connector 34"/>
+          <p:cNvCxnSpPr>
+            <a:stCxn id="29" idx="3"/>
+            <a:endCxn id="20" idx="1"/>
+          </p:cNvCxnSpPr>
+          <p:nvPr/>
+        </p:nvCxnSpPr>
+        <p:spPr>
+          <a:xfrm>
+            <a:off x="4876800" y="1830324"/>
+            <a:ext cx="228600" cy="0"/>
+          </a:xfrm>
+          <a:prstGeom prst="straightConnector1">
+            <a:avLst/>
+          </a:prstGeom>
+          <a:ln>
+            <a:tailEnd type="arrow"/>
+          </a:ln>
+        </p:spPr>
+        <p:style>
+          <a:lnRef idx="1">
+            <a:schemeClr val="accent1"/>
+          </a:lnRef>
+          <a:fillRef idx="2">
+            <a:schemeClr val="accent1"/>
+          </a:fillRef>
+          <a:effectRef idx="1">
+            <a:schemeClr val="accent1"/>
+          </a:effectRef>
+          <a:fontRef idx="minor">
+            <a:schemeClr val="dk1"/>
+          </a:fontRef>
+        </p:style>
+      </p:cxnSp>
+      <p:sp>
+        <p:nvSpPr>
+          <p:cNvPr id="53" name="Flowchart: Process 52"/>
+          <p:cNvSpPr/>
+          <p:nvPr/>
+        </p:nvSpPr>
+        <p:spPr>
+          <a:xfrm>
+            <a:off x="7315200" y="1524000"/>
+            <a:ext cx="990600" cy="612648"/>
+          </a:xfrm>
+          <a:prstGeom prst="flowChartProcess">
+            <a:avLst/>
+          </a:prstGeom>
+        </p:spPr>
+        <p:style>
+          <a:lnRef idx="1">
+            <a:schemeClr val="accent1"/>
+          </a:lnRef>
+          <a:fillRef idx="2">
+            <a:schemeClr val="accent1"/>
+          </a:fillRef>
+          <a:effectRef idx="1">
+            <a:schemeClr val="accent1"/>
+          </a:effectRef>
+          <a:fontRef idx="minor">
+            <a:schemeClr val="dk1"/>
+          </a:fontRef>
+        </p:style>
+        <p:txBody>
+          <a:bodyPr rtlCol="0" anchor="ctr"/>
+          <a:lstStyle/>
+          <a:p>
+            <a:pPr algn="ctr"/>
+            <a:r>
+              <a:rPr lang="en-US" sz="1050" dirty="0" smtClean="0"/>
+              <a:t>Get edge from list</a:t>
+            </a:r>
+            <a:endParaRPr lang="en-US" sz="1050" dirty="0"/>
+          </a:p>
+        </p:txBody>
+      </p:sp>
+      <p:cxnSp>
+        <p:nvCxnSpPr>
+          <p:cNvPr id="57" name="Straight Arrow Connector 56"/>
+          <p:cNvCxnSpPr>
+            <a:stCxn id="20" idx="3"/>
+            <a:endCxn id="53" idx="1"/>
+          </p:cNvCxnSpPr>
+          <p:nvPr/>
+        </p:nvCxnSpPr>
+        <p:spPr>
+          <a:xfrm>
+            <a:off x="6400800" y="1830324"/>
+            <a:ext cx="914400" cy="0"/>
+          </a:xfrm>
+          <a:prstGeom prst="straightConnector1">
+            <a:avLst/>
+          </a:prstGeom>
+          <a:ln>
+            <a:tailEnd type="arrow"/>
+          </a:ln>
+        </p:spPr>
+        <p:style>
+          <a:lnRef idx="1">
+            <a:schemeClr val="accent1"/>
+          </a:lnRef>
+          <a:fillRef idx="2">
+            <a:schemeClr val="accent1"/>
+          </a:fillRef>
+          <a:effectRef idx="1">
+            <a:schemeClr val="accent1"/>
+          </a:effectRef>
+          <a:fontRef idx="minor">
+            <a:schemeClr val="dk1"/>
+          </a:fontRef>
+        </p:style>
+      </p:cxnSp>
+      <p:sp>
+        <p:nvSpPr>
+          <p:cNvPr id="71" name="TextBox 70"/>
+          <p:cNvSpPr txBox="1"/>
+          <p:nvPr/>
+        </p:nvSpPr>
+        <p:spPr>
+          <a:xfrm>
+            <a:off x="4953000" y="2362200"/>
+            <a:ext cx="455574" cy="369332"/>
+          </a:xfrm>
+          <a:prstGeom prst="rect">
+            <a:avLst/>
+          </a:prstGeom>
+          <a:noFill/>
+        </p:spPr>
+        <p:txBody>
+          <a:bodyPr wrap="none" rtlCol="0">
+            <a:spAutoFit/>
+          </a:bodyPr>
+          <a:lstStyle/>
+          <a:p>
+            <a:r>
+              <a:rPr lang="en-US" dirty="0" smtClean="0"/>
+              <a:t>No</a:t>
+            </a:r>
+            <a:endParaRPr lang="en-US" dirty="0"/>
+          </a:p>
+        </p:txBody>
+      </p:sp>
+      <p:sp>
+        <p:nvSpPr>
+          <p:cNvPr id="73" name="TextBox 72"/>
+          <p:cNvSpPr txBox="1"/>
+          <p:nvPr/>
+        </p:nvSpPr>
+        <p:spPr>
+          <a:xfrm>
+            <a:off x="6553200" y="1447800"/>
+            <a:ext cx="485518" cy="369332"/>
+          </a:xfrm>
+          <a:prstGeom prst="rect">
+            <a:avLst/>
+          </a:prstGeom>
+          <a:noFill/>
+        </p:spPr>
+        <p:txBody>
+          <a:bodyPr wrap="none" rtlCol="0">
+            <a:spAutoFit/>
+          </a:bodyPr>
+          <a:lstStyle/>
+          <a:p>
+            <a:r>
+              <a:rPr lang="en-US" dirty="0" smtClean="0"/>
+              <a:t>Yes</a:t>
+            </a:r>
+            <a:endParaRPr lang="en-US" dirty="0"/>
+          </a:p>
+        </p:txBody>
+      </p:sp>
+      <p:sp>
+        <p:nvSpPr>
+          <p:cNvPr id="75" name="Flowchart: Process 74"/>
+          <p:cNvSpPr/>
+          <p:nvPr/>
+        </p:nvSpPr>
+        <p:spPr>
+          <a:xfrm>
+            <a:off x="7315200" y="2438400"/>
+            <a:ext cx="990600" cy="612648"/>
+          </a:xfrm>
+          <a:prstGeom prst="flowChartProcess">
+            <a:avLst/>
+          </a:prstGeom>
+        </p:spPr>
+        <p:style>
+          <a:lnRef idx="1">
+            <a:schemeClr val="accent1"/>
+          </a:lnRef>
+          <a:fillRef idx="2">
+            <a:schemeClr val="accent1"/>
+          </a:fillRef>
+          <a:effectRef idx="1">
+            <a:schemeClr val="accent1"/>
+          </a:effectRef>
+          <a:fontRef idx="minor">
+            <a:schemeClr val="dk1"/>
+          </a:fontRef>
+        </p:style>
+        <p:txBody>
+          <a:bodyPr rtlCol="0" anchor="ctr"/>
+          <a:lstStyle/>
+          <a:p>
+            <a:pPr algn="ctr"/>
+            <a:r>
+              <a:rPr lang="en-US" sz="1050" dirty="0" smtClean="0"/>
+              <a:t>Generate edge in the graph</a:t>
+            </a:r>
+            <a:endParaRPr lang="en-US" sz="1050" dirty="0"/>
+          </a:p>
+        </p:txBody>
+      </p:sp>
+      <p:cxnSp>
+        <p:nvCxnSpPr>
+          <p:cNvPr id="77" name="Straight Arrow Connector 76"/>
+          <p:cNvCxnSpPr>
+            <a:stCxn id="53" idx="2"/>
+            <a:endCxn id="75" idx="0"/>
+          </p:cNvCxnSpPr>
+          <p:nvPr/>
+        </p:nvCxnSpPr>
+        <p:spPr>
+          <a:xfrm>
+            <a:off x="7810500" y="2136648"/>
+            <a:ext cx="0" cy="301752"/>
+          </a:xfrm>
+          <a:prstGeom prst="straightConnector1">
+            <a:avLst/>
+          </a:prstGeom>
+          <a:ln>
+            <a:tailEnd type="arrow"/>
+          </a:ln>
+        </p:spPr>
+        <p:style>
+          <a:lnRef idx="1">
+            <a:schemeClr val="accent1"/>
+          </a:lnRef>
+          <a:fillRef idx="0">
+            <a:schemeClr val="accent1"/>
+          </a:fillRef>
+          <a:effectRef idx="0">
+            <a:schemeClr val="accent1"/>
+          </a:effectRef>
+          <a:fontRef idx="minor">
+            <a:schemeClr val="tx1"/>
+          </a:fontRef>
+        </p:style>
+      </p:cxnSp>
+      <p:sp>
+        <p:nvSpPr>
+          <p:cNvPr id="78" name="Flowchart: Decision 77"/>
+          <p:cNvSpPr/>
+          <p:nvPr/>
+        </p:nvSpPr>
+        <p:spPr>
+          <a:xfrm>
+            <a:off x="7162800" y="3352800"/>
+            <a:ext cx="1295400" cy="612648"/>
+          </a:xfrm>
+          <a:prstGeom prst="flowChartDecision">
+            <a:avLst/>
+          </a:prstGeom>
+        </p:spPr>
+        <p:style>
+          <a:lnRef idx="1">
+            <a:schemeClr val="accent1"/>
+          </a:lnRef>
+          <a:fillRef idx="2">
+            <a:schemeClr val="accent1"/>
+          </a:fillRef>
+          <a:effectRef idx="1">
+            <a:schemeClr val="accent1"/>
+          </a:effectRef>
+          <a:fontRef idx="minor">
+            <a:schemeClr val="dk1"/>
+          </a:fontRef>
+        </p:style>
+        <p:txBody>
+          <a:bodyPr rtlCol="0" anchor="ctr"/>
+          <a:lstStyle/>
+          <a:p>
+            <a:pPr algn="ctr"/>
+            <a:r>
+              <a:rPr lang="en-US" sz="1050" dirty="0" smtClean="0"/>
+              <a:t>Finished?</a:t>
+            </a:r>
+            <a:endParaRPr lang="en-US" sz="1050" dirty="0"/>
+          </a:p>
+        </p:txBody>
+      </p:sp>
+      <p:cxnSp>
+        <p:nvCxnSpPr>
+          <p:cNvPr id="79" name="Straight Arrow Connector 78"/>
+          <p:cNvCxnSpPr>
+            <a:stCxn id="75" idx="2"/>
+            <a:endCxn id="78" idx="0"/>
+          </p:cNvCxnSpPr>
+          <p:nvPr/>
+        </p:nvCxnSpPr>
+        <p:spPr>
+          <a:xfrm>
+            <a:off x="7810500" y="3051048"/>
+            <a:ext cx="0" cy="301752"/>
+          </a:xfrm>
+          <a:prstGeom prst="straightConnector1">
+            <a:avLst/>
+          </a:prstGeom>
+          <a:ln>
+            <a:tailEnd type="arrow"/>
+          </a:ln>
+        </p:spPr>
+        <p:style>
+          <a:lnRef idx="1">
+            <a:schemeClr val="accent1"/>
+          </a:lnRef>
+          <a:fillRef idx="0">
+            <a:schemeClr val="accent1"/>
+          </a:fillRef>
+          <a:effectRef idx="0">
+            <a:schemeClr val="accent1"/>
+          </a:effectRef>
+          <a:fontRef idx="minor">
+            <a:schemeClr val="tx1"/>
+          </a:fontRef>
+        </p:style>
+      </p:cxnSp>
+      <p:sp>
+        <p:nvSpPr>
+          <p:cNvPr id="87" name="Flowchart: Process 86"/>
+          <p:cNvSpPr/>
+          <p:nvPr/>
+        </p:nvSpPr>
+        <p:spPr>
+          <a:xfrm>
+            <a:off x="5334000" y="3352800"/>
+            <a:ext cx="990600" cy="612648"/>
+          </a:xfrm>
+          <a:prstGeom prst="flowChartProcess">
+            <a:avLst/>
+          </a:prstGeom>
+        </p:spPr>
+        <p:style>
+          <a:lnRef idx="1">
+            <a:schemeClr val="accent1"/>
+          </a:lnRef>
+          <a:fillRef idx="2">
+            <a:schemeClr val="accent1"/>
+          </a:fillRef>
+          <a:effectRef idx="1">
+            <a:schemeClr val="accent1"/>
+          </a:effectRef>
+          <a:fontRef idx="minor">
+            <a:schemeClr val="dk1"/>
+          </a:fontRef>
+        </p:style>
+        <p:txBody>
+          <a:bodyPr rtlCol="0" anchor="ctr"/>
+          <a:lstStyle/>
+          <a:p>
+            <a:pPr algn="ctr"/>
+            <a:r>
+              <a:rPr lang="en-US" sz="1050" dirty="0" smtClean="0"/>
+              <a:t>Draw Graph</a:t>
+            </a:r>
+            <a:endParaRPr lang="en-US" sz="1050" dirty="0"/>
+          </a:p>
+        </p:txBody>
+      </p:sp>
+      <p:cxnSp>
+        <p:nvCxnSpPr>
+          <p:cNvPr id="88" name="Straight Arrow Connector 87"/>
+          <p:cNvCxnSpPr>
+            <a:stCxn id="78" idx="1"/>
+            <a:endCxn id="87" idx="3"/>
+          </p:cNvCxnSpPr>
+          <p:nvPr/>
+        </p:nvCxnSpPr>
+        <p:spPr>
+          <a:xfrm flipH="1">
+            <a:off x="6324600" y="3659124"/>
+            <a:ext cx="838200" cy="0"/>
+          </a:xfrm>
+          <a:prstGeom prst="straightConnector1">
+            <a:avLst/>
+          </a:prstGeom>
+          <a:ln>
+            <a:tailEnd type="arrow"/>
+          </a:ln>
+        </p:spPr>
+        <p:style>
+          <a:lnRef idx="1">
+            <a:schemeClr val="accent1"/>
+          </a:lnRef>
+          <a:fillRef idx="0">
+            <a:schemeClr val="accent1"/>
+          </a:fillRef>
+          <a:effectRef idx="0">
+            <a:schemeClr val="accent1"/>
+          </a:effectRef>
+          <a:fontRef idx="minor">
+            <a:schemeClr val="tx1"/>
+          </a:fontRef>
+        </p:style>
+      </p:cxnSp>
+      <p:cxnSp>
+        <p:nvCxnSpPr>
+          <p:cNvPr id="91" name="Elbow Connector 90"/>
+          <p:cNvCxnSpPr>
+            <a:stCxn id="78" idx="3"/>
+            <a:endCxn id="53" idx="3"/>
+          </p:cNvCxnSpPr>
+          <p:nvPr/>
+        </p:nvCxnSpPr>
+        <p:spPr>
+          <a:xfrm flipH="1" flipV="1">
+            <a:off x="8305800" y="1830324"/>
+            <a:ext cx="152400" cy="1828800"/>
+          </a:xfrm>
+          <a:prstGeom prst="bentConnector3">
+            <a:avLst>
+              <a:gd name="adj1" fmla="val -150000"/>
+            </a:avLst>
+          </a:prstGeom>
+          <a:ln>
+            <a:tailEnd type="arrow"/>
+          </a:ln>
+        </p:spPr>
+        <p:style>
+          <a:lnRef idx="1">
+            <a:schemeClr val="accent1"/>
+          </a:lnRef>
+          <a:fillRef idx="2">
+            <a:schemeClr val="accent1"/>
+          </a:fillRef>
+          <a:effectRef idx="1">
+            <a:schemeClr val="accent1"/>
+          </a:effectRef>
+          <a:fontRef idx="minor">
+            <a:schemeClr val="dk1"/>
+          </a:fontRef>
+        </p:style>
+      </p:cxnSp>
+      <p:sp>
+        <p:nvSpPr>
+          <p:cNvPr id="94" name="TextBox 93"/>
+          <p:cNvSpPr txBox="1"/>
+          <p:nvPr/>
+        </p:nvSpPr>
+        <p:spPr>
+          <a:xfrm>
+            <a:off x="6553200" y="3276600"/>
+            <a:ext cx="485518" cy="369332"/>
+          </a:xfrm>
+          <a:prstGeom prst="rect">
+            <a:avLst/>
+          </a:prstGeom>
+          <a:noFill/>
+        </p:spPr>
+        <p:txBody>
+          <a:bodyPr wrap="none" rtlCol="0">
+            <a:spAutoFit/>
+          </a:bodyPr>
+          <a:lstStyle/>
+          <a:p>
+            <a:r>
+              <a:rPr lang="en-US" dirty="0" smtClean="0"/>
+              <a:t>Yes</a:t>
+            </a:r>
+            <a:endParaRPr lang="en-US" dirty="0"/>
+          </a:p>
+        </p:txBody>
+      </p:sp>
+      <p:sp>
+        <p:nvSpPr>
+          <p:cNvPr id="95" name="TextBox 94"/>
+          <p:cNvSpPr txBox="1"/>
+          <p:nvPr/>
+        </p:nvSpPr>
+        <p:spPr>
+          <a:xfrm>
+            <a:off x="8229600" y="3200400"/>
+            <a:ext cx="455574" cy="369332"/>
+          </a:xfrm>
+          <a:prstGeom prst="rect">
+            <a:avLst/>
+          </a:prstGeom>
+          <a:noFill/>
+        </p:spPr>
+        <p:txBody>
+          <a:bodyPr wrap="none" rtlCol="0">
+            <a:spAutoFit/>
+          </a:bodyPr>
+          <a:lstStyle/>
+          <a:p>
+            <a:r>
+              <a:rPr lang="en-US" dirty="0" smtClean="0"/>
+              <a:t>No</a:t>
+            </a:r>
+            <a:endParaRPr lang="en-US" dirty="0"/>
+          </a:p>
+        </p:txBody>
+      </p:sp>
+      <p:sp>
+        <p:nvSpPr>
+          <p:cNvPr id="97" name="TextBox 96"/>
+          <p:cNvSpPr txBox="1"/>
+          <p:nvPr/>
+        </p:nvSpPr>
+        <p:spPr>
+          <a:xfrm>
+            <a:off x="2362200" y="609600"/>
+            <a:ext cx="2075696" cy="369332"/>
+          </a:xfrm>
+          <a:prstGeom prst="rect">
+            <a:avLst/>
+          </a:prstGeom>
+          <a:noFill/>
+        </p:spPr>
+        <p:txBody>
+          <a:bodyPr wrap="none" rtlCol="0">
+            <a:spAutoFit/>
+          </a:bodyPr>
+          <a:lstStyle/>
+          <a:p>
+            <a:r>
+              <a:rPr lang="en-US" dirty="0" smtClean="0"/>
+              <a:t>Processing Input file</a:t>
+            </a:r>
+            <a:endParaRPr lang="en-US" dirty="0"/>
+          </a:p>
+        </p:txBody>
+      </p:sp>
+      <p:sp>
+        <p:nvSpPr>
+          <p:cNvPr id="99" name="TextBox 98"/>
+          <p:cNvSpPr txBox="1"/>
+          <p:nvPr/>
+        </p:nvSpPr>
+        <p:spPr>
+          <a:xfrm>
+            <a:off x="7010400" y="685800"/>
+            <a:ext cx="1856214" cy="369332"/>
+          </a:xfrm>
+          <a:prstGeom prst="rect">
+            <a:avLst/>
+          </a:prstGeom>
+          <a:noFill/>
+        </p:spPr>
+        <p:txBody>
+          <a:bodyPr wrap="none" rtlCol="0">
+            <a:spAutoFit/>
+          </a:bodyPr>
+          <a:lstStyle/>
+          <a:p>
+            <a:r>
+              <a:rPr lang="en-US" dirty="0" smtClean="0"/>
+              <a:t>Generating Graph</a:t>
+            </a:r>
+            <a:endParaRPr lang="en-US" dirty="0"/>
+          </a:p>
+        </p:txBody>
+      </p:sp>
+      <p:sp>
+        <p:nvSpPr>
+          <p:cNvPr id="101" name="TextBox 100"/>
+          <p:cNvSpPr txBox="1"/>
+          <p:nvPr/>
+        </p:nvSpPr>
+        <p:spPr>
+          <a:xfrm>
+            <a:off x="5171706" y="2895600"/>
+            <a:ext cx="1305294" cy="369332"/>
+          </a:xfrm>
+          <a:prstGeom prst="rect">
+            <a:avLst/>
+          </a:prstGeom>
+          <a:noFill/>
+        </p:spPr>
+        <p:txBody>
+          <a:bodyPr wrap="none" rtlCol="0">
+            <a:spAutoFit/>
+          </a:bodyPr>
+          <a:lstStyle/>
+          <a:p>
+            <a:r>
+              <a:rPr lang="en-US" dirty="0" smtClean="0"/>
+              <a:t>Draw Graph</a:t>
             </a:r>
             <a:endParaRPr lang="en-US" dirty="0"/>
           </a:p>

</xml_diff>

<commit_message>
Updated chapter 6 draft
</commit_message>
<xml_diff>
--- a/Documents/Dissertacao/dissertation_figures.pptx
+++ b/Documents/Dissertacao/dissertation_figures.pptx
@@ -19,6 +19,7 @@
     <p:sldId id="269" r:id="rId13"/>
     <p:sldId id="270" r:id="rId14"/>
     <p:sldId id="271" r:id="rId15"/>
+    <p:sldId id="272" r:id="rId16"/>
   </p:sldIdLst>
   <p:sldSz cx="9144000" cy="6858000" type="screen4x3"/>
   <p:notesSz cx="6858000" cy="9144000"/>
@@ -302,7 +303,7 @@
             <a:fld id="{331B0D56-BC31-4997-A5B4-54E7FF55EA8B}" type="datetimeFigureOut">
               <a:rPr lang="en-US" smtClean="0"/>
               <a:pPr/>
-              <a:t>5/16/2013</a:t>
+              <a:t>6/3/2013</a:t>
             </a:fld>
             <a:endParaRPr lang="en-US"/>
           </a:p>
@@ -469,7 +470,7 @@
             <a:fld id="{331B0D56-BC31-4997-A5B4-54E7FF55EA8B}" type="datetimeFigureOut">
               <a:rPr lang="en-US" smtClean="0"/>
               <a:pPr/>
-              <a:t>5/16/2013</a:t>
+              <a:t>6/3/2013</a:t>
             </a:fld>
             <a:endParaRPr lang="en-US"/>
           </a:p>
@@ -646,7 +647,7 @@
             <a:fld id="{331B0D56-BC31-4997-A5B4-54E7FF55EA8B}" type="datetimeFigureOut">
               <a:rPr lang="en-US" smtClean="0"/>
               <a:pPr/>
-              <a:t>5/16/2013</a:t>
+              <a:t>6/3/2013</a:t>
             </a:fld>
             <a:endParaRPr lang="en-US"/>
           </a:p>
@@ -813,7 +814,7 @@
             <a:fld id="{331B0D56-BC31-4997-A5B4-54E7FF55EA8B}" type="datetimeFigureOut">
               <a:rPr lang="en-US" smtClean="0"/>
               <a:pPr/>
-              <a:t>5/16/2013</a:t>
+              <a:t>6/3/2013</a:t>
             </a:fld>
             <a:endParaRPr lang="en-US"/>
           </a:p>
@@ -1056,7 +1057,7 @@
             <a:fld id="{331B0D56-BC31-4997-A5B4-54E7FF55EA8B}" type="datetimeFigureOut">
               <a:rPr lang="en-US" smtClean="0"/>
               <a:pPr/>
-              <a:t>5/16/2013</a:t>
+              <a:t>6/3/2013</a:t>
             </a:fld>
             <a:endParaRPr lang="en-US"/>
           </a:p>
@@ -1341,7 +1342,7 @@
             <a:fld id="{331B0D56-BC31-4997-A5B4-54E7FF55EA8B}" type="datetimeFigureOut">
               <a:rPr lang="en-US" smtClean="0"/>
               <a:pPr/>
-              <a:t>5/16/2013</a:t>
+              <a:t>6/3/2013</a:t>
             </a:fld>
             <a:endParaRPr lang="en-US"/>
           </a:p>
@@ -1760,7 +1761,7 @@
             <a:fld id="{331B0D56-BC31-4997-A5B4-54E7FF55EA8B}" type="datetimeFigureOut">
               <a:rPr lang="en-US" smtClean="0"/>
               <a:pPr/>
-              <a:t>5/16/2013</a:t>
+              <a:t>6/3/2013</a:t>
             </a:fld>
             <a:endParaRPr lang="en-US"/>
           </a:p>
@@ -1875,7 +1876,7 @@
             <a:fld id="{331B0D56-BC31-4997-A5B4-54E7FF55EA8B}" type="datetimeFigureOut">
               <a:rPr lang="en-US" smtClean="0"/>
               <a:pPr/>
-              <a:t>5/16/2013</a:t>
+              <a:t>6/3/2013</a:t>
             </a:fld>
             <a:endParaRPr lang="en-US"/>
           </a:p>
@@ -1967,7 +1968,7 @@
             <a:fld id="{331B0D56-BC31-4997-A5B4-54E7FF55EA8B}" type="datetimeFigureOut">
               <a:rPr lang="en-US" smtClean="0"/>
               <a:pPr/>
-              <a:t>5/16/2013</a:t>
+              <a:t>6/3/2013</a:t>
             </a:fld>
             <a:endParaRPr lang="en-US"/>
           </a:p>
@@ -2241,7 +2242,7 @@
             <a:fld id="{331B0D56-BC31-4997-A5B4-54E7FF55EA8B}" type="datetimeFigureOut">
               <a:rPr lang="en-US" smtClean="0"/>
               <a:pPr/>
-              <a:t>5/16/2013</a:t>
+              <a:t>6/3/2013</a:t>
             </a:fld>
             <a:endParaRPr lang="en-US"/>
           </a:p>
@@ -2491,7 +2492,7 @@
             <a:fld id="{331B0D56-BC31-4997-A5B4-54E7FF55EA8B}" type="datetimeFigureOut">
               <a:rPr lang="en-US" smtClean="0"/>
               <a:pPr/>
-              <a:t>5/16/2013</a:t>
+              <a:t>6/3/2013</a:t>
             </a:fld>
             <a:endParaRPr lang="en-US"/>
           </a:p>
@@ -2701,7 +2702,7 @@
             <a:fld id="{331B0D56-BC31-4997-A5B4-54E7FF55EA8B}" type="datetimeFigureOut">
               <a:rPr lang="en-US" smtClean="0"/>
               <a:pPr/>
-              <a:t>5/16/2013</a:t>
+              <a:t>6/3/2013</a:t>
             </a:fld>
             <a:endParaRPr lang="en-US"/>
           </a:p>
@@ -8464,6 +8465,1110 @@
               <a:t>Draw Graph</a:t>
             </a:r>
             <a:endParaRPr lang="en-US" dirty="0"/>
+          </a:p>
+        </p:txBody>
+      </p:sp>
+    </p:spTree>
+  </p:cSld>
+  <p:clrMapOvr>
+    <a:masterClrMapping/>
+  </p:clrMapOvr>
+</p:sld>
+</file>
+
+<file path=ppt/slides/slide15.xml><?xml version="1.0" encoding="utf-8"?>
+<p:sld xmlns:a="http://schemas.openxmlformats.org/drawingml/2006/main" xmlns:r="http://schemas.openxmlformats.org/officeDocument/2006/relationships" xmlns:p="http://schemas.openxmlformats.org/presentationml/2006/main">
+  <p:cSld>
+    <p:spTree>
+      <p:nvGrpSpPr>
+        <p:cNvPr id="1" name=""/>
+        <p:cNvGrpSpPr/>
+        <p:nvPr/>
+      </p:nvGrpSpPr>
+      <p:grpSpPr>
+        <a:xfrm>
+          <a:off x="0" y="0"/>
+          <a:ext cx="0" cy="0"/>
+          <a:chOff x="0" y="0"/>
+          <a:chExt cx="0" cy="0"/>
+        </a:xfrm>
+      </p:grpSpPr>
+      <p:sp>
+        <p:nvSpPr>
+          <p:cNvPr id="71" name="Rectangle 70"/>
+          <p:cNvSpPr/>
+          <p:nvPr/>
+        </p:nvSpPr>
+        <p:spPr>
+          <a:xfrm>
+            <a:off x="6934200" y="4038600"/>
+            <a:ext cx="2133600" cy="990600"/>
+          </a:xfrm>
+          <a:prstGeom prst="rect">
+            <a:avLst/>
+          </a:prstGeom>
+        </p:spPr>
+        <p:style>
+          <a:lnRef idx="2">
+            <a:schemeClr val="accent1"/>
+          </a:lnRef>
+          <a:fillRef idx="1">
+            <a:schemeClr val="lt1"/>
+          </a:fillRef>
+          <a:effectRef idx="0">
+            <a:schemeClr val="accent1"/>
+          </a:effectRef>
+          <a:fontRef idx="minor">
+            <a:schemeClr val="dk1"/>
+          </a:fontRef>
+        </p:style>
+        <p:txBody>
+          <a:bodyPr rtlCol="0" anchor="ctr"/>
+          <a:lstStyle/>
+          <a:p>
+            <a:pPr algn="ctr"/>
+            <a:endParaRPr lang="en-US"/>
+          </a:p>
+        </p:txBody>
+      </p:sp>
+      <p:sp>
+        <p:nvSpPr>
+          <p:cNvPr id="61" name="Rectangle 60"/>
+          <p:cNvSpPr/>
+          <p:nvPr/>
+        </p:nvSpPr>
+        <p:spPr>
+          <a:xfrm>
+            <a:off x="2286000" y="1524000"/>
+            <a:ext cx="4495800" cy="3505200"/>
+          </a:xfrm>
+          <a:prstGeom prst="rect">
+            <a:avLst/>
+          </a:prstGeom>
+        </p:spPr>
+        <p:style>
+          <a:lnRef idx="2">
+            <a:schemeClr val="accent1"/>
+          </a:lnRef>
+          <a:fillRef idx="1">
+            <a:schemeClr val="lt1"/>
+          </a:fillRef>
+          <a:effectRef idx="0">
+            <a:schemeClr val="accent1"/>
+          </a:effectRef>
+          <a:fontRef idx="minor">
+            <a:schemeClr val="dk1"/>
+          </a:fontRef>
+        </p:style>
+        <p:txBody>
+          <a:bodyPr rtlCol="0" anchor="ctr"/>
+          <a:lstStyle/>
+          <a:p>
+            <a:pPr algn="ctr"/>
+            <a:endParaRPr lang="en-US"/>
+          </a:p>
+        </p:txBody>
+      </p:sp>
+      <p:sp>
+        <p:nvSpPr>
+          <p:cNvPr id="60" name="Rectangle 59"/>
+          <p:cNvSpPr/>
+          <p:nvPr/>
+        </p:nvSpPr>
+        <p:spPr>
+          <a:xfrm>
+            <a:off x="76200" y="1447800"/>
+            <a:ext cx="2133600" cy="914400"/>
+          </a:xfrm>
+          <a:prstGeom prst="rect">
+            <a:avLst/>
+          </a:prstGeom>
+        </p:spPr>
+        <p:style>
+          <a:lnRef idx="2">
+            <a:schemeClr val="accent1"/>
+          </a:lnRef>
+          <a:fillRef idx="1">
+            <a:schemeClr val="lt1"/>
+          </a:fillRef>
+          <a:effectRef idx="0">
+            <a:schemeClr val="accent1"/>
+          </a:effectRef>
+          <a:fontRef idx="minor">
+            <a:schemeClr val="dk1"/>
+          </a:fontRef>
+        </p:style>
+        <p:txBody>
+          <a:bodyPr rtlCol="0" anchor="ctr"/>
+          <a:lstStyle/>
+          <a:p>
+            <a:pPr algn="ctr"/>
+            <a:endParaRPr lang="en-US" dirty="0"/>
+          </a:p>
+        </p:txBody>
+      </p:sp>
+      <p:sp>
+        <p:nvSpPr>
+          <p:cNvPr id="4" name="Flowchart: Process 3"/>
+          <p:cNvSpPr/>
+          <p:nvPr/>
+        </p:nvSpPr>
+        <p:spPr>
+          <a:xfrm>
+            <a:off x="152400" y="1676400"/>
+            <a:ext cx="914400" cy="612648"/>
+          </a:xfrm>
+          <a:prstGeom prst="flowChartProcess">
+            <a:avLst/>
+          </a:prstGeom>
+        </p:spPr>
+        <p:style>
+          <a:lnRef idx="1">
+            <a:schemeClr val="accent1"/>
+          </a:lnRef>
+          <a:fillRef idx="2">
+            <a:schemeClr val="accent1"/>
+          </a:fillRef>
+          <a:effectRef idx="1">
+            <a:schemeClr val="accent1"/>
+          </a:effectRef>
+          <a:fontRef idx="minor">
+            <a:schemeClr val="dk1"/>
+          </a:fontRef>
+        </p:style>
+        <p:txBody>
+          <a:bodyPr rtlCol="0" anchor="ctr"/>
+          <a:lstStyle/>
+          <a:p>
+            <a:pPr algn="ctr"/>
+            <a:r>
+              <a:rPr lang="en-US" sz="900" dirty="0" smtClean="0"/>
+              <a:t>Play a SDM game session</a:t>
+            </a:r>
+            <a:endParaRPr lang="en-US" sz="900" dirty="0"/>
+          </a:p>
+        </p:txBody>
+      </p:sp>
+      <p:sp>
+        <p:nvSpPr>
+          <p:cNvPr id="5" name="Flowchart: Process 4"/>
+          <p:cNvSpPr/>
+          <p:nvPr/>
+        </p:nvSpPr>
+        <p:spPr>
+          <a:xfrm>
+            <a:off x="1219200" y="1676400"/>
+            <a:ext cx="914400" cy="612648"/>
+          </a:xfrm>
+          <a:prstGeom prst="flowChartProcess">
+            <a:avLst/>
+          </a:prstGeom>
+        </p:spPr>
+        <p:style>
+          <a:lnRef idx="1">
+            <a:schemeClr val="accent1"/>
+          </a:lnRef>
+          <a:fillRef idx="2">
+            <a:schemeClr val="accent1"/>
+          </a:fillRef>
+          <a:effectRef idx="1">
+            <a:schemeClr val="accent1"/>
+          </a:effectRef>
+          <a:fontRef idx="minor">
+            <a:schemeClr val="dk1"/>
+          </a:fontRef>
+        </p:style>
+        <p:txBody>
+          <a:bodyPr rtlCol="0" anchor="ctr"/>
+          <a:lstStyle/>
+          <a:p>
+            <a:pPr algn="ctr"/>
+            <a:r>
+              <a:rPr lang="en-US" sz="900" dirty="0" smtClean="0"/>
+              <a:t>Create Questionnaire</a:t>
+            </a:r>
+            <a:endParaRPr lang="en-US" sz="900" dirty="0"/>
+          </a:p>
+        </p:txBody>
+      </p:sp>
+      <p:sp>
+        <p:nvSpPr>
+          <p:cNvPr id="6" name="Flowchart: Process 5"/>
+          <p:cNvSpPr/>
+          <p:nvPr/>
+        </p:nvSpPr>
+        <p:spPr>
+          <a:xfrm>
+            <a:off x="2438400" y="1676400"/>
+            <a:ext cx="914400" cy="612648"/>
+          </a:xfrm>
+          <a:prstGeom prst="flowChartProcess">
+            <a:avLst/>
+          </a:prstGeom>
+        </p:spPr>
+        <p:style>
+          <a:lnRef idx="1">
+            <a:schemeClr val="accent1"/>
+          </a:lnRef>
+          <a:fillRef idx="2">
+            <a:schemeClr val="accent1"/>
+          </a:fillRef>
+          <a:effectRef idx="1">
+            <a:schemeClr val="accent1"/>
+          </a:effectRef>
+          <a:fontRef idx="minor">
+            <a:schemeClr val="dk1"/>
+          </a:fontRef>
+        </p:style>
+        <p:txBody>
+          <a:bodyPr rtlCol="0" anchor="ctr"/>
+          <a:lstStyle/>
+          <a:p>
+            <a:pPr algn="ctr"/>
+            <a:r>
+              <a:rPr lang="en-US" sz="900" dirty="0" smtClean="0"/>
+              <a:t>Watch SDM tutorial video</a:t>
+            </a:r>
+            <a:endParaRPr lang="en-US" sz="900" dirty="0"/>
+          </a:p>
+        </p:txBody>
+      </p:sp>
+      <p:sp>
+        <p:nvSpPr>
+          <p:cNvPr id="7" name="Flowchart: Process 6"/>
+          <p:cNvSpPr/>
+          <p:nvPr/>
+        </p:nvSpPr>
+        <p:spPr>
+          <a:xfrm>
+            <a:off x="3581400" y="1676400"/>
+            <a:ext cx="914400" cy="612648"/>
+          </a:xfrm>
+          <a:prstGeom prst="flowChartProcess">
+            <a:avLst/>
+          </a:prstGeom>
+        </p:spPr>
+        <p:style>
+          <a:lnRef idx="1">
+            <a:schemeClr val="accent1"/>
+          </a:lnRef>
+          <a:fillRef idx="2">
+            <a:schemeClr val="accent1"/>
+          </a:fillRef>
+          <a:effectRef idx="1">
+            <a:schemeClr val="accent1"/>
+          </a:effectRef>
+          <a:fontRef idx="minor">
+            <a:schemeClr val="dk1"/>
+          </a:fontRef>
+        </p:style>
+        <p:txBody>
+          <a:bodyPr rtlCol="0" anchor="ctr"/>
+          <a:lstStyle/>
+          <a:p>
+            <a:pPr algn="ctr"/>
+            <a:r>
+              <a:rPr lang="en-US" sz="900" dirty="0" smtClean="0"/>
+              <a:t>Watch video from the game session</a:t>
+            </a:r>
+            <a:endParaRPr lang="en-US" sz="900" dirty="0"/>
+          </a:p>
+        </p:txBody>
+      </p:sp>
+      <p:sp>
+        <p:nvSpPr>
+          <p:cNvPr id="8" name="Flowchart: Decision 7"/>
+          <p:cNvSpPr/>
+          <p:nvPr/>
+        </p:nvSpPr>
+        <p:spPr>
+          <a:xfrm>
+            <a:off x="4724400" y="1676400"/>
+            <a:ext cx="1371600" cy="612648"/>
+          </a:xfrm>
+          <a:prstGeom prst="flowChartDecision">
+            <a:avLst/>
+          </a:prstGeom>
+        </p:spPr>
+        <p:style>
+          <a:lnRef idx="1">
+            <a:schemeClr val="accent1"/>
+          </a:lnRef>
+          <a:fillRef idx="2">
+            <a:schemeClr val="accent1"/>
+          </a:fillRef>
+          <a:effectRef idx="1">
+            <a:schemeClr val="accent1"/>
+          </a:effectRef>
+          <a:fontRef idx="minor">
+            <a:schemeClr val="dk1"/>
+          </a:fontRef>
+        </p:style>
+        <p:txBody>
+          <a:bodyPr rtlCol="0" anchor="ctr"/>
+          <a:lstStyle/>
+          <a:p>
+            <a:pPr algn="ctr"/>
+            <a:r>
+              <a:rPr lang="en-US" sz="900" dirty="0" smtClean="0"/>
+              <a:t>Divide in two groups</a:t>
+            </a:r>
+            <a:endParaRPr lang="en-US" sz="900" dirty="0"/>
+          </a:p>
+        </p:txBody>
+      </p:sp>
+      <p:sp>
+        <p:nvSpPr>
+          <p:cNvPr id="9" name="Flowchart: Process 8"/>
+          <p:cNvSpPr/>
+          <p:nvPr/>
+        </p:nvSpPr>
+        <p:spPr>
+          <a:xfrm>
+            <a:off x="5562600" y="2667000"/>
+            <a:ext cx="914400" cy="612648"/>
+          </a:xfrm>
+          <a:prstGeom prst="flowChartProcess">
+            <a:avLst/>
+          </a:prstGeom>
+        </p:spPr>
+        <p:style>
+          <a:lnRef idx="1">
+            <a:schemeClr val="accent1"/>
+          </a:lnRef>
+          <a:fillRef idx="2">
+            <a:schemeClr val="accent1"/>
+          </a:fillRef>
+          <a:effectRef idx="1">
+            <a:schemeClr val="accent1"/>
+          </a:effectRef>
+          <a:fontRef idx="minor">
+            <a:schemeClr val="dk1"/>
+          </a:fontRef>
+        </p:style>
+        <p:txBody>
+          <a:bodyPr rtlCol="0" anchor="ctr"/>
+          <a:lstStyle/>
+          <a:p>
+            <a:pPr algn="ctr"/>
+            <a:r>
+              <a:rPr lang="en-US" sz="900" dirty="0" smtClean="0"/>
+              <a:t>Answer Questionnaire</a:t>
+            </a:r>
+            <a:endParaRPr lang="en-US" sz="900" dirty="0"/>
+          </a:p>
+        </p:txBody>
+      </p:sp>
+      <p:sp>
+        <p:nvSpPr>
+          <p:cNvPr id="10" name="Flowchart: Process 9"/>
+          <p:cNvSpPr/>
+          <p:nvPr/>
+        </p:nvSpPr>
+        <p:spPr>
+          <a:xfrm>
+            <a:off x="4267200" y="2667000"/>
+            <a:ext cx="914400" cy="612648"/>
+          </a:xfrm>
+          <a:prstGeom prst="flowChartProcess">
+            <a:avLst/>
+          </a:prstGeom>
+        </p:spPr>
+        <p:style>
+          <a:lnRef idx="1">
+            <a:schemeClr val="accent1"/>
+          </a:lnRef>
+          <a:fillRef idx="2">
+            <a:schemeClr val="accent1"/>
+          </a:fillRef>
+          <a:effectRef idx="1">
+            <a:schemeClr val="accent1"/>
+          </a:effectRef>
+          <a:fontRef idx="minor">
+            <a:schemeClr val="dk1"/>
+          </a:fontRef>
+        </p:style>
+        <p:txBody>
+          <a:bodyPr rtlCol="0" anchor="ctr"/>
+          <a:lstStyle/>
+          <a:p>
+            <a:pPr algn="ctr"/>
+            <a:r>
+              <a:rPr lang="en-US" sz="900" dirty="0" smtClean="0"/>
+              <a:t>Watch Proof Viewer Tutorial</a:t>
+            </a:r>
+            <a:endParaRPr lang="en-US" sz="900" dirty="0"/>
+          </a:p>
+        </p:txBody>
+      </p:sp>
+      <p:sp>
+        <p:nvSpPr>
+          <p:cNvPr id="11" name="Flowchart: Process 10"/>
+          <p:cNvSpPr/>
+          <p:nvPr/>
+        </p:nvSpPr>
+        <p:spPr>
+          <a:xfrm>
+            <a:off x="4267200" y="3505200"/>
+            <a:ext cx="914400" cy="612648"/>
+          </a:xfrm>
+          <a:prstGeom prst="flowChartProcess">
+            <a:avLst/>
+          </a:prstGeom>
+        </p:spPr>
+        <p:style>
+          <a:lnRef idx="1">
+            <a:schemeClr val="accent1"/>
+          </a:lnRef>
+          <a:fillRef idx="2">
+            <a:schemeClr val="accent1"/>
+          </a:fillRef>
+          <a:effectRef idx="1">
+            <a:schemeClr val="accent1"/>
+          </a:effectRef>
+          <a:fontRef idx="minor">
+            <a:schemeClr val="dk1"/>
+          </a:fontRef>
+        </p:style>
+        <p:txBody>
+          <a:bodyPr rtlCol="0" anchor="ctr"/>
+          <a:lstStyle/>
+          <a:p>
+            <a:pPr algn="ctr"/>
+            <a:r>
+              <a:rPr lang="en-US" sz="900" dirty="0" smtClean="0"/>
+              <a:t>Use Proof Viewer</a:t>
+            </a:r>
+            <a:endParaRPr lang="en-US" sz="900" dirty="0"/>
+          </a:p>
+        </p:txBody>
+      </p:sp>
+      <p:sp>
+        <p:nvSpPr>
+          <p:cNvPr id="12" name="Flowchart: Process 11"/>
+          <p:cNvSpPr/>
+          <p:nvPr/>
+        </p:nvSpPr>
+        <p:spPr>
+          <a:xfrm>
+            <a:off x="4267200" y="4343400"/>
+            <a:ext cx="914400" cy="612648"/>
+          </a:xfrm>
+          <a:prstGeom prst="flowChartProcess">
+            <a:avLst/>
+          </a:prstGeom>
+        </p:spPr>
+        <p:style>
+          <a:lnRef idx="1">
+            <a:schemeClr val="accent1"/>
+          </a:lnRef>
+          <a:fillRef idx="2">
+            <a:schemeClr val="accent1"/>
+          </a:fillRef>
+          <a:effectRef idx="1">
+            <a:schemeClr val="accent1"/>
+          </a:effectRef>
+          <a:fontRef idx="minor">
+            <a:schemeClr val="dk1"/>
+          </a:fontRef>
+        </p:style>
+        <p:txBody>
+          <a:bodyPr rtlCol="0" anchor="ctr"/>
+          <a:lstStyle/>
+          <a:p>
+            <a:pPr algn="ctr"/>
+            <a:r>
+              <a:rPr lang="en-US" sz="900" dirty="0" smtClean="0"/>
+              <a:t>Answer Questionnaire</a:t>
+            </a:r>
+            <a:endParaRPr lang="en-US" sz="900" dirty="0"/>
+          </a:p>
+        </p:txBody>
+      </p:sp>
+      <p:cxnSp>
+        <p:nvCxnSpPr>
+          <p:cNvPr id="14" name="Straight Arrow Connector 13"/>
+          <p:cNvCxnSpPr>
+            <a:stCxn id="4" idx="3"/>
+            <a:endCxn id="5" idx="1"/>
+          </p:cNvCxnSpPr>
+          <p:nvPr/>
+        </p:nvCxnSpPr>
+        <p:spPr>
+          <a:xfrm>
+            <a:off x="1066800" y="1982724"/>
+            <a:ext cx="152400" cy="0"/>
+          </a:xfrm>
+          <a:prstGeom prst="straightConnector1">
+            <a:avLst/>
+          </a:prstGeom>
+          <a:ln>
+            <a:tailEnd type="arrow"/>
+          </a:ln>
+        </p:spPr>
+        <p:style>
+          <a:lnRef idx="1">
+            <a:schemeClr val="accent1"/>
+          </a:lnRef>
+          <a:fillRef idx="0">
+            <a:schemeClr val="accent1"/>
+          </a:fillRef>
+          <a:effectRef idx="0">
+            <a:schemeClr val="accent1"/>
+          </a:effectRef>
+          <a:fontRef idx="minor">
+            <a:schemeClr val="tx1"/>
+          </a:fontRef>
+        </p:style>
+      </p:cxnSp>
+      <p:cxnSp>
+        <p:nvCxnSpPr>
+          <p:cNvPr id="16" name="Straight Arrow Connector 15"/>
+          <p:cNvCxnSpPr>
+            <a:stCxn id="5" idx="3"/>
+            <a:endCxn id="6" idx="1"/>
+          </p:cNvCxnSpPr>
+          <p:nvPr/>
+        </p:nvCxnSpPr>
+        <p:spPr>
+          <a:xfrm>
+            <a:off x="2133600" y="1982724"/>
+            <a:ext cx="304800" cy="0"/>
+          </a:xfrm>
+          <a:prstGeom prst="straightConnector1">
+            <a:avLst/>
+          </a:prstGeom>
+          <a:ln>
+            <a:tailEnd type="arrow"/>
+          </a:ln>
+        </p:spPr>
+        <p:style>
+          <a:lnRef idx="1">
+            <a:schemeClr val="accent1"/>
+          </a:lnRef>
+          <a:fillRef idx="0">
+            <a:schemeClr val="accent1"/>
+          </a:fillRef>
+          <a:effectRef idx="0">
+            <a:schemeClr val="accent1"/>
+          </a:effectRef>
+          <a:fontRef idx="minor">
+            <a:schemeClr val="tx1"/>
+          </a:fontRef>
+        </p:style>
+      </p:cxnSp>
+      <p:cxnSp>
+        <p:nvCxnSpPr>
+          <p:cNvPr id="18" name="Straight Arrow Connector 17"/>
+          <p:cNvCxnSpPr>
+            <a:stCxn id="6" idx="3"/>
+            <a:endCxn id="7" idx="1"/>
+          </p:cNvCxnSpPr>
+          <p:nvPr/>
+        </p:nvCxnSpPr>
+        <p:spPr>
+          <a:xfrm>
+            <a:off x="3352800" y="1982724"/>
+            <a:ext cx="228600" cy="0"/>
+          </a:xfrm>
+          <a:prstGeom prst="straightConnector1">
+            <a:avLst/>
+          </a:prstGeom>
+          <a:ln>
+            <a:tailEnd type="arrow"/>
+          </a:ln>
+        </p:spPr>
+        <p:style>
+          <a:lnRef idx="1">
+            <a:schemeClr val="accent1"/>
+          </a:lnRef>
+          <a:fillRef idx="0">
+            <a:schemeClr val="accent1"/>
+          </a:fillRef>
+          <a:effectRef idx="0">
+            <a:schemeClr val="accent1"/>
+          </a:effectRef>
+          <a:fontRef idx="minor">
+            <a:schemeClr val="tx1"/>
+          </a:fontRef>
+        </p:style>
+      </p:cxnSp>
+      <p:cxnSp>
+        <p:nvCxnSpPr>
+          <p:cNvPr id="20" name="Straight Arrow Connector 19"/>
+          <p:cNvCxnSpPr>
+            <a:stCxn id="7" idx="3"/>
+            <a:endCxn id="8" idx="1"/>
+          </p:cNvCxnSpPr>
+          <p:nvPr/>
+        </p:nvCxnSpPr>
+        <p:spPr>
+          <a:xfrm>
+            <a:off x="4495800" y="1982724"/>
+            <a:ext cx="228600" cy="0"/>
+          </a:xfrm>
+          <a:prstGeom prst="straightConnector1">
+            <a:avLst/>
+          </a:prstGeom>
+          <a:ln>
+            <a:tailEnd type="arrow"/>
+          </a:ln>
+        </p:spPr>
+        <p:style>
+          <a:lnRef idx="1">
+            <a:schemeClr val="accent1"/>
+          </a:lnRef>
+          <a:fillRef idx="0">
+            <a:schemeClr val="accent1"/>
+          </a:fillRef>
+          <a:effectRef idx="0">
+            <a:schemeClr val="accent1"/>
+          </a:effectRef>
+          <a:fontRef idx="minor">
+            <a:schemeClr val="tx1"/>
+          </a:fontRef>
+        </p:style>
+      </p:cxnSp>
+      <p:cxnSp>
+        <p:nvCxnSpPr>
+          <p:cNvPr id="22" name="Straight Arrow Connector 21"/>
+          <p:cNvCxnSpPr>
+            <a:stCxn id="8" idx="2"/>
+            <a:endCxn id="9" idx="0"/>
+          </p:cNvCxnSpPr>
+          <p:nvPr/>
+        </p:nvCxnSpPr>
+        <p:spPr>
+          <a:xfrm>
+            <a:off x="5410200" y="2289048"/>
+            <a:ext cx="609600" cy="377952"/>
+          </a:xfrm>
+          <a:prstGeom prst="straightConnector1">
+            <a:avLst/>
+          </a:prstGeom>
+          <a:ln>
+            <a:tailEnd type="arrow"/>
+          </a:ln>
+        </p:spPr>
+        <p:style>
+          <a:lnRef idx="1">
+            <a:schemeClr val="accent1"/>
+          </a:lnRef>
+          <a:fillRef idx="0">
+            <a:schemeClr val="accent1"/>
+          </a:fillRef>
+          <a:effectRef idx="0">
+            <a:schemeClr val="accent1"/>
+          </a:effectRef>
+          <a:fontRef idx="minor">
+            <a:schemeClr val="tx1"/>
+          </a:fontRef>
+        </p:style>
+      </p:cxnSp>
+      <p:cxnSp>
+        <p:nvCxnSpPr>
+          <p:cNvPr id="24" name="Straight Arrow Connector 23"/>
+          <p:cNvCxnSpPr>
+            <a:stCxn id="8" idx="2"/>
+            <a:endCxn id="10" idx="0"/>
+          </p:cNvCxnSpPr>
+          <p:nvPr/>
+        </p:nvCxnSpPr>
+        <p:spPr>
+          <a:xfrm flipH="1">
+            <a:off x="4724400" y="2289048"/>
+            <a:ext cx="685800" cy="377952"/>
+          </a:xfrm>
+          <a:prstGeom prst="straightConnector1">
+            <a:avLst/>
+          </a:prstGeom>
+          <a:ln>
+            <a:tailEnd type="arrow"/>
+          </a:ln>
+        </p:spPr>
+        <p:style>
+          <a:lnRef idx="1">
+            <a:schemeClr val="accent1"/>
+          </a:lnRef>
+          <a:fillRef idx="0">
+            <a:schemeClr val="accent1"/>
+          </a:fillRef>
+          <a:effectRef idx="0">
+            <a:schemeClr val="accent1"/>
+          </a:effectRef>
+          <a:fontRef idx="minor">
+            <a:schemeClr val="tx1"/>
+          </a:fontRef>
+        </p:style>
+      </p:cxnSp>
+      <p:cxnSp>
+        <p:nvCxnSpPr>
+          <p:cNvPr id="26" name="Straight Arrow Connector 25"/>
+          <p:cNvCxnSpPr>
+            <a:stCxn id="10" idx="2"/>
+            <a:endCxn id="11" idx="0"/>
+          </p:cNvCxnSpPr>
+          <p:nvPr/>
+        </p:nvCxnSpPr>
+        <p:spPr>
+          <a:xfrm>
+            <a:off x="4724400" y="3279648"/>
+            <a:ext cx="0" cy="225552"/>
+          </a:xfrm>
+          <a:prstGeom prst="straightConnector1">
+            <a:avLst/>
+          </a:prstGeom>
+          <a:ln>
+            <a:tailEnd type="arrow"/>
+          </a:ln>
+        </p:spPr>
+        <p:style>
+          <a:lnRef idx="1">
+            <a:schemeClr val="accent1"/>
+          </a:lnRef>
+          <a:fillRef idx="0">
+            <a:schemeClr val="accent1"/>
+          </a:fillRef>
+          <a:effectRef idx="0">
+            <a:schemeClr val="accent1"/>
+          </a:effectRef>
+          <a:fontRef idx="minor">
+            <a:schemeClr val="tx1"/>
+          </a:fontRef>
+        </p:style>
+      </p:cxnSp>
+      <p:cxnSp>
+        <p:nvCxnSpPr>
+          <p:cNvPr id="28" name="Straight Arrow Connector 27"/>
+          <p:cNvCxnSpPr>
+            <a:stCxn id="11" idx="2"/>
+            <a:endCxn id="12" idx="0"/>
+          </p:cNvCxnSpPr>
+          <p:nvPr/>
+        </p:nvCxnSpPr>
+        <p:spPr>
+          <a:xfrm>
+            <a:off x="4724400" y="4117848"/>
+            <a:ext cx="0" cy="225552"/>
+          </a:xfrm>
+          <a:prstGeom prst="straightConnector1">
+            <a:avLst/>
+          </a:prstGeom>
+          <a:ln>
+            <a:tailEnd type="arrow"/>
+          </a:ln>
+        </p:spPr>
+        <p:style>
+          <a:lnRef idx="1">
+            <a:schemeClr val="accent1"/>
+          </a:lnRef>
+          <a:fillRef idx="0">
+            <a:schemeClr val="accent1"/>
+          </a:fillRef>
+          <a:effectRef idx="0">
+            <a:schemeClr val="accent1"/>
+          </a:effectRef>
+          <a:fontRef idx="minor">
+            <a:schemeClr val="tx1"/>
+          </a:fontRef>
+        </p:style>
+      </p:cxnSp>
+      <p:sp>
+        <p:nvSpPr>
+          <p:cNvPr id="54" name="Flowchart: Process 53"/>
+          <p:cNvSpPr/>
+          <p:nvPr/>
+        </p:nvSpPr>
+        <p:spPr>
+          <a:xfrm>
+            <a:off x="7010400" y="4340352"/>
+            <a:ext cx="914400" cy="612648"/>
+          </a:xfrm>
+          <a:prstGeom prst="flowChartProcess">
+            <a:avLst/>
+          </a:prstGeom>
+        </p:spPr>
+        <p:style>
+          <a:lnRef idx="1">
+            <a:schemeClr val="accent1"/>
+          </a:lnRef>
+          <a:fillRef idx="2">
+            <a:schemeClr val="accent1"/>
+          </a:fillRef>
+          <a:effectRef idx="1">
+            <a:schemeClr val="accent1"/>
+          </a:effectRef>
+          <a:fontRef idx="minor">
+            <a:schemeClr val="dk1"/>
+          </a:fontRef>
+        </p:style>
+        <p:txBody>
+          <a:bodyPr rtlCol="0" anchor="ctr"/>
+          <a:lstStyle/>
+          <a:p>
+            <a:pPr algn="ctr"/>
+            <a:r>
+              <a:rPr lang="en-US" sz="900" dirty="0" smtClean="0"/>
+              <a:t>Correct Questionnaire</a:t>
+            </a:r>
+            <a:endParaRPr lang="en-US" sz="900" dirty="0"/>
+          </a:p>
+        </p:txBody>
+      </p:sp>
+      <p:cxnSp>
+        <p:nvCxnSpPr>
+          <p:cNvPr id="56" name="Straight Arrow Connector 55"/>
+          <p:cNvCxnSpPr>
+            <a:stCxn id="9" idx="2"/>
+            <a:endCxn id="54" idx="1"/>
+          </p:cNvCxnSpPr>
+          <p:nvPr/>
+        </p:nvCxnSpPr>
+        <p:spPr>
+          <a:xfrm>
+            <a:off x="6019800" y="3279648"/>
+            <a:ext cx="990600" cy="1367028"/>
+          </a:xfrm>
+          <a:prstGeom prst="straightConnector1">
+            <a:avLst/>
+          </a:prstGeom>
+          <a:ln>
+            <a:tailEnd type="arrow"/>
+          </a:ln>
+        </p:spPr>
+        <p:style>
+          <a:lnRef idx="1">
+            <a:schemeClr val="accent1"/>
+          </a:lnRef>
+          <a:fillRef idx="0">
+            <a:schemeClr val="accent1"/>
+          </a:fillRef>
+          <a:effectRef idx="0">
+            <a:schemeClr val="accent1"/>
+          </a:effectRef>
+          <a:fontRef idx="minor">
+            <a:schemeClr val="tx1"/>
+          </a:fontRef>
+        </p:style>
+      </p:cxnSp>
+      <p:cxnSp>
+        <p:nvCxnSpPr>
+          <p:cNvPr id="58" name="Straight Arrow Connector 57"/>
+          <p:cNvCxnSpPr>
+            <a:stCxn id="12" idx="3"/>
+            <a:endCxn id="54" idx="1"/>
+          </p:cNvCxnSpPr>
+          <p:nvPr/>
+        </p:nvCxnSpPr>
+        <p:spPr>
+          <a:xfrm flipV="1">
+            <a:off x="5181600" y="4646676"/>
+            <a:ext cx="1828800" cy="3048"/>
+          </a:xfrm>
+          <a:prstGeom prst="straightConnector1">
+            <a:avLst/>
+          </a:prstGeom>
+          <a:ln>
+            <a:tailEnd type="arrow"/>
+          </a:ln>
+        </p:spPr>
+        <p:style>
+          <a:lnRef idx="1">
+            <a:schemeClr val="accent1"/>
+          </a:lnRef>
+          <a:fillRef idx="0">
+            <a:schemeClr val="accent1"/>
+          </a:fillRef>
+          <a:effectRef idx="0">
+            <a:schemeClr val="accent1"/>
+          </a:effectRef>
+          <a:fontRef idx="minor">
+            <a:schemeClr val="tx1"/>
+          </a:fontRef>
+        </p:style>
+      </p:cxnSp>
+      <p:sp>
+        <p:nvSpPr>
+          <p:cNvPr id="66" name="Flowchart: Process 65"/>
+          <p:cNvSpPr/>
+          <p:nvPr/>
+        </p:nvSpPr>
+        <p:spPr>
+          <a:xfrm>
+            <a:off x="8077200" y="4343400"/>
+            <a:ext cx="914400" cy="612648"/>
+          </a:xfrm>
+          <a:prstGeom prst="flowChartProcess">
+            <a:avLst/>
+          </a:prstGeom>
+        </p:spPr>
+        <p:style>
+          <a:lnRef idx="1">
+            <a:schemeClr val="accent1"/>
+          </a:lnRef>
+          <a:fillRef idx="2">
+            <a:schemeClr val="accent1"/>
+          </a:fillRef>
+          <a:effectRef idx="1">
+            <a:schemeClr val="accent1"/>
+          </a:effectRef>
+          <a:fontRef idx="minor">
+            <a:schemeClr val="dk1"/>
+          </a:fontRef>
+        </p:style>
+        <p:txBody>
+          <a:bodyPr rtlCol="0" anchor="ctr"/>
+          <a:lstStyle/>
+          <a:p>
+            <a:pPr algn="ctr"/>
+            <a:r>
+              <a:rPr lang="en-US" sz="900" dirty="0" smtClean="0"/>
+              <a:t>Calculate Results</a:t>
+            </a:r>
+            <a:endParaRPr lang="en-US" sz="900" dirty="0"/>
+          </a:p>
+        </p:txBody>
+      </p:sp>
+      <p:cxnSp>
+        <p:nvCxnSpPr>
+          <p:cNvPr id="68" name="Straight Arrow Connector 67"/>
+          <p:cNvCxnSpPr>
+            <a:stCxn id="54" idx="3"/>
+            <a:endCxn id="66" idx="1"/>
+          </p:cNvCxnSpPr>
+          <p:nvPr/>
+        </p:nvCxnSpPr>
+        <p:spPr>
+          <a:xfrm>
+            <a:off x="7924800" y="4646676"/>
+            <a:ext cx="152400" cy="3048"/>
+          </a:xfrm>
+          <a:prstGeom prst="straightConnector1">
+            <a:avLst/>
+          </a:prstGeom>
+          <a:ln>
+            <a:tailEnd type="arrow"/>
+          </a:ln>
+        </p:spPr>
+        <p:style>
+          <a:lnRef idx="1">
+            <a:schemeClr val="accent1"/>
+          </a:lnRef>
+          <a:fillRef idx="0">
+            <a:schemeClr val="accent1"/>
+          </a:fillRef>
+          <a:effectRef idx="0">
+            <a:schemeClr val="accent1"/>
+          </a:effectRef>
+          <a:fontRef idx="minor">
+            <a:schemeClr val="tx1"/>
+          </a:fontRef>
+        </p:style>
+      </p:cxnSp>
+      <p:sp>
+        <p:nvSpPr>
+          <p:cNvPr id="69" name="TextBox 68"/>
+          <p:cNvSpPr txBox="1"/>
+          <p:nvPr/>
+        </p:nvSpPr>
+        <p:spPr>
+          <a:xfrm>
+            <a:off x="381000" y="1414790"/>
+            <a:ext cx="1676400" cy="261610"/>
+          </a:xfrm>
+          <a:prstGeom prst="rect">
+            <a:avLst/>
+          </a:prstGeom>
+          <a:noFill/>
+        </p:spPr>
+        <p:txBody>
+          <a:bodyPr wrap="square" rtlCol="0">
+            <a:spAutoFit/>
+          </a:bodyPr>
+          <a:lstStyle/>
+          <a:p>
+            <a:pPr algn="ctr"/>
+            <a:r>
+              <a:rPr lang="en-US" sz="1100" dirty="0" smtClean="0"/>
+              <a:t>Generate Questionnaire</a:t>
+            </a:r>
+            <a:endParaRPr lang="en-US" sz="1100" dirty="0"/>
+          </a:p>
+        </p:txBody>
+      </p:sp>
+      <p:sp>
+        <p:nvSpPr>
+          <p:cNvPr id="70" name="TextBox 69"/>
+          <p:cNvSpPr txBox="1"/>
+          <p:nvPr/>
+        </p:nvSpPr>
+        <p:spPr>
+          <a:xfrm>
+            <a:off x="2447279" y="2667000"/>
+            <a:ext cx="1132040" cy="600164"/>
+          </a:xfrm>
+          <a:prstGeom prst="rect">
+            <a:avLst/>
+          </a:prstGeom>
+          <a:noFill/>
+        </p:spPr>
+        <p:txBody>
+          <a:bodyPr wrap="none" rtlCol="0">
+            <a:spAutoFit/>
+          </a:bodyPr>
+          <a:lstStyle/>
+          <a:p>
+            <a:pPr algn="ctr"/>
+            <a:r>
+              <a:rPr lang="en-US" sz="1100" dirty="0" smtClean="0"/>
+              <a:t>Run Experiment </a:t>
+            </a:r>
+          </a:p>
+          <a:p>
+            <a:pPr algn="ctr"/>
+            <a:r>
+              <a:rPr lang="en-US" sz="1100" dirty="0" smtClean="0"/>
+              <a:t>with </a:t>
+            </a:r>
+          </a:p>
+          <a:p>
+            <a:pPr algn="ctr"/>
+            <a:r>
+              <a:rPr lang="en-US" sz="1100" dirty="0" smtClean="0"/>
+              <a:t>Volunteers</a:t>
+            </a:r>
+            <a:endParaRPr lang="en-US" sz="1100" dirty="0"/>
+          </a:p>
+        </p:txBody>
+      </p:sp>
+      <p:sp>
+        <p:nvSpPr>
+          <p:cNvPr id="72" name="TextBox 71"/>
+          <p:cNvSpPr txBox="1"/>
+          <p:nvPr/>
+        </p:nvSpPr>
+        <p:spPr>
+          <a:xfrm>
+            <a:off x="7467600" y="4038600"/>
+            <a:ext cx="1447800" cy="261610"/>
+          </a:xfrm>
+          <a:prstGeom prst="rect">
+            <a:avLst/>
+          </a:prstGeom>
+          <a:noFill/>
+        </p:spPr>
+        <p:txBody>
+          <a:bodyPr wrap="square" rtlCol="0">
+            <a:spAutoFit/>
+          </a:bodyPr>
+          <a:lstStyle/>
+          <a:p>
+            <a:pPr algn="ctr"/>
+            <a:r>
+              <a:rPr lang="en-US" sz="1100" dirty="0" smtClean="0"/>
+              <a:t>Analyze Results</a:t>
+            </a:r>
+            <a:endParaRPr lang="en-US" sz="1100" dirty="0"/>
           </a:p>
         </p:txBody>
       </p:sp>

</xml_diff>

<commit_message>
Added introduction to dissertation_Chapter6 v1.docx Made some changes in dissertation_chapter5 v2.docx (from the revision) Changed some figures in dissertation_figures.pptx
</commit_message>
<xml_diff>
--- a/Documents/Dissertacao/dissertation_figures.pptx
+++ b/Documents/Dissertacao/dissertation_figures.pptx
@@ -303,7 +303,7 @@
             <a:fld id="{331B0D56-BC31-4997-A5B4-54E7FF55EA8B}" type="datetimeFigureOut">
               <a:rPr lang="en-US" smtClean="0"/>
               <a:pPr/>
-              <a:t>6/3/2013</a:t>
+              <a:t>6/10/2013</a:t>
             </a:fld>
             <a:endParaRPr lang="en-US"/>
           </a:p>
@@ -470,7 +470,7 @@
             <a:fld id="{331B0D56-BC31-4997-A5B4-54E7FF55EA8B}" type="datetimeFigureOut">
               <a:rPr lang="en-US" smtClean="0"/>
               <a:pPr/>
-              <a:t>6/3/2013</a:t>
+              <a:t>6/10/2013</a:t>
             </a:fld>
             <a:endParaRPr lang="en-US"/>
           </a:p>
@@ -647,7 +647,7 @@
             <a:fld id="{331B0D56-BC31-4997-A5B4-54E7FF55EA8B}" type="datetimeFigureOut">
               <a:rPr lang="en-US" smtClean="0"/>
               <a:pPr/>
-              <a:t>6/3/2013</a:t>
+              <a:t>6/10/2013</a:t>
             </a:fld>
             <a:endParaRPr lang="en-US"/>
           </a:p>
@@ -814,7 +814,7 @@
             <a:fld id="{331B0D56-BC31-4997-A5B4-54E7FF55EA8B}" type="datetimeFigureOut">
               <a:rPr lang="en-US" smtClean="0"/>
               <a:pPr/>
-              <a:t>6/3/2013</a:t>
+              <a:t>6/10/2013</a:t>
             </a:fld>
             <a:endParaRPr lang="en-US"/>
           </a:p>
@@ -1057,7 +1057,7 @@
             <a:fld id="{331B0D56-BC31-4997-A5B4-54E7FF55EA8B}" type="datetimeFigureOut">
               <a:rPr lang="en-US" smtClean="0"/>
               <a:pPr/>
-              <a:t>6/3/2013</a:t>
+              <a:t>6/10/2013</a:t>
             </a:fld>
             <a:endParaRPr lang="en-US"/>
           </a:p>
@@ -1342,7 +1342,7 @@
             <a:fld id="{331B0D56-BC31-4997-A5B4-54E7FF55EA8B}" type="datetimeFigureOut">
               <a:rPr lang="en-US" smtClean="0"/>
               <a:pPr/>
-              <a:t>6/3/2013</a:t>
+              <a:t>6/10/2013</a:t>
             </a:fld>
             <a:endParaRPr lang="en-US"/>
           </a:p>
@@ -1761,7 +1761,7 @@
             <a:fld id="{331B0D56-BC31-4997-A5B4-54E7FF55EA8B}" type="datetimeFigureOut">
               <a:rPr lang="en-US" smtClean="0"/>
               <a:pPr/>
-              <a:t>6/3/2013</a:t>
+              <a:t>6/10/2013</a:t>
             </a:fld>
             <a:endParaRPr lang="en-US"/>
           </a:p>
@@ -1876,7 +1876,7 @@
             <a:fld id="{331B0D56-BC31-4997-A5B4-54E7FF55EA8B}" type="datetimeFigureOut">
               <a:rPr lang="en-US" smtClean="0"/>
               <a:pPr/>
-              <a:t>6/3/2013</a:t>
+              <a:t>6/10/2013</a:t>
             </a:fld>
             <a:endParaRPr lang="en-US"/>
           </a:p>
@@ -1968,7 +1968,7 @@
             <a:fld id="{331B0D56-BC31-4997-A5B4-54E7FF55EA8B}" type="datetimeFigureOut">
               <a:rPr lang="en-US" smtClean="0"/>
               <a:pPr/>
-              <a:t>6/3/2013</a:t>
+              <a:t>6/10/2013</a:t>
             </a:fld>
             <a:endParaRPr lang="en-US"/>
           </a:p>
@@ -2242,7 +2242,7 @@
             <a:fld id="{331B0D56-BC31-4997-A5B4-54E7FF55EA8B}" type="datetimeFigureOut">
               <a:rPr lang="en-US" smtClean="0"/>
               <a:pPr/>
-              <a:t>6/3/2013</a:t>
+              <a:t>6/10/2013</a:t>
             </a:fld>
             <a:endParaRPr lang="en-US"/>
           </a:p>
@@ -2492,7 +2492,7 @@
             <a:fld id="{331B0D56-BC31-4997-A5B4-54E7FF55EA8B}" type="datetimeFigureOut">
               <a:rPr lang="en-US" smtClean="0"/>
               <a:pPr/>
-              <a:t>6/3/2013</a:t>
+              <a:t>6/10/2013</a:t>
             </a:fld>
             <a:endParaRPr lang="en-US"/>
           </a:p>
@@ -2702,7 +2702,7 @@
             <a:fld id="{331B0D56-BC31-4997-A5B4-54E7FF55EA8B}" type="datetimeFigureOut">
               <a:rPr lang="en-US" smtClean="0"/>
               <a:pPr/>
-              <a:t>6/3/2013</a:t>
+              <a:t>6/10/2013</a:t>
             </a:fld>
             <a:endParaRPr lang="en-US"/>
           </a:p>
@@ -7594,7 +7594,11 @@
             <a:pPr algn="ctr"/>
             <a:r>
               <a:rPr lang="en-US" sz="1050" dirty="0" smtClean="0"/>
-              <a:t>Generate Edge’s Vertices</a:t>
+              <a:t>Create Edge’s </a:t>
+            </a:r>
+            <a:r>
+              <a:rPr lang="en-US" sz="1050" dirty="0" smtClean="0"/>
+              <a:t>Vertices</a:t>
             </a:r>
             <a:endParaRPr lang="en-US" sz="1050" dirty="0"/>
           </a:p>
@@ -8082,7 +8086,11 @@
             <a:pPr algn="ctr"/>
             <a:r>
               <a:rPr lang="en-US" sz="1050" dirty="0" smtClean="0"/>
-              <a:t>Generate edge in the graph</a:t>
+              <a:t>Add edge </a:t>
+            </a:r>
+            <a:r>
+              <a:rPr lang="en-US" sz="1050" dirty="0" smtClean="0"/>
+              <a:t>in the graph</a:t>
             </a:r>
             <a:endParaRPr lang="en-US" sz="1050" dirty="0"/>
           </a:p>

</xml_diff>

<commit_message>
Added draft from chapter 2 Changed figure scale in dissertation_figures.pptx
</commit_message>
<xml_diff>
--- a/Documents/Dissertacao/dissertation_figures.pptx
+++ b/Documents/Dissertacao/dissertation_figures.pptx
@@ -303,7 +303,7 @@
             <a:fld id="{331B0D56-BC31-4997-A5B4-54E7FF55EA8B}" type="datetimeFigureOut">
               <a:rPr lang="en-US" smtClean="0"/>
               <a:pPr/>
-              <a:t>6/10/2013</a:t>
+              <a:t>6/17/2013</a:t>
             </a:fld>
             <a:endParaRPr lang="en-US"/>
           </a:p>
@@ -470,7 +470,7 @@
             <a:fld id="{331B0D56-BC31-4997-A5B4-54E7FF55EA8B}" type="datetimeFigureOut">
               <a:rPr lang="en-US" smtClean="0"/>
               <a:pPr/>
-              <a:t>6/10/2013</a:t>
+              <a:t>6/17/2013</a:t>
             </a:fld>
             <a:endParaRPr lang="en-US"/>
           </a:p>
@@ -647,7 +647,7 @@
             <a:fld id="{331B0D56-BC31-4997-A5B4-54E7FF55EA8B}" type="datetimeFigureOut">
               <a:rPr lang="en-US" smtClean="0"/>
               <a:pPr/>
-              <a:t>6/10/2013</a:t>
+              <a:t>6/17/2013</a:t>
             </a:fld>
             <a:endParaRPr lang="en-US"/>
           </a:p>
@@ -814,7 +814,7 @@
             <a:fld id="{331B0D56-BC31-4997-A5B4-54E7FF55EA8B}" type="datetimeFigureOut">
               <a:rPr lang="en-US" smtClean="0"/>
               <a:pPr/>
-              <a:t>6/10/2013</a:t>
+              <a:t>6/17/2013</a:t>
             </a:fld>
             <a:endParaRPr lang="en-US"/>
           </a:p>
@@ -1057,7 +1057,7 @@
             <a:fld id="{331B0D56-BC31-4997-A5B4-54E7FF55EA8B}" type="datetimeFigureOut">
               <a:rPr lang="en-US" smtClean="0"/>
               <a:pPr/>
-              <a:t>6/10/2013</a:t>
+              <a:t>6/17/2013</a:t>
             </a:fld>
             <a:endParaRPr lang="en-US"/>
           </a:p>
@@ -1342,7 +1342,7 @@
             <a:fld id="{331B0D56-BC31-4997-A5B4-54E7FF55EA8B}" type="datetimeFigureOut">
               <a:rPr lang="en-US" smtClean="0"/>
               <a:pPr/>
-              <a:t>6/10/2013</a:t>
+              <a:t>6/17/2013</a:t>
             </a:fld>
             <a:endParaRPr lang="en-US"/>
           </a:p>
@@ -1761,7 +1761,7 @@
             <a:fld id="{331B0D56-BC31-4997-A5B4-54E7FF55EA8B}" type="datetimeFigureOut">
               <a:rPr lang="en-US" smtClean="0"/>
               <a:pPr/>
-              <a:t>6/10/2013</a:t>
+              <a:t>6/17/2013</a:t>
             </a:fld>
             <a:endParaRPr lang="en-US"/>
           </a:p>
@@ -1876,7 +1876,7 @@
             <a:fld id="{331B0D56-BC31-4997-A5B4-54E7FF55EA8B}" type="datetimeFigureOut">
               <a:rPr lang="en-US" smtClean="0"/>
               <a:pPr/>
-              <a:t>6/10/2013</a:t>
+              <a:t>6/17/2013</a:t>
             </a:fld>
             <a:endParaRPr lang="en-US"/>
           </a:p>
@@ -1968,7 +1968,7 @@
             <a:fld id="{331B0D56-BC31-4997-A5B4-54E7FF55EA8B}" type="datetimeFigureOut">
               <a:rPr lang="en-US" smtClean="0"/>
               <a:pPr/>
-              <a:t>6/10/2013</a:t>
+              <a:t>6/17/2013</a:t>
             </a:fld>
             <a:endParaRPr lang="en-US"/>
           </a:p>
@@ -2242,7 +2242,7 @@
             <a:fld id="{331B0D56-BC31-4997-A5B4-54E7FF55EA8B}" type="datetimeFigureOut">
               <a:rPr lang="en-US" smtClean="0"/>
               <a:pPr/>
-              <a:t>6/10/2013</a:t>
+              <a:t>6/17/2013</a:t>
             </a:fld>
             <a:endParaRPr lang="en-US"/>
           </a:p>
@@ -2492,7 +2492,7 @@
             <a:fld id="{331B0D56-BC31-4997-A5B4-54E7FF55EA8B}" type="datetimeFigureOut">
               <a:rPr lang="en-US" smtClean="0"/>
               <a:pPr/>
-              <a:t>6/10/2013</a:t>
+              <a:t>6/17/2013</a:t>
             </a:fld>
             <a:endParaRPr lang="en-US"/>
           </a:p>
@@ -2702,7 +2702,7 @@
             <a:fld id="{331B0D56-BC31-4997-A5B4-54E7FF55EA8B}" type="datetimeFigureOut">
               <a:rPr lang="en-US" smtClean="0"/>
               <a:pPr/>
-              <a:t>6/10/2013</a:t>
+              <a:t>6/17/2013</a:t>
             </a:fld>
             <a:endParaRPr lang="en-US"/>
           </a:p>
@@ -3108,10 +3108,10 @@
           <a:p>
             <a:pPr algn="ctr"/>
             <a:r>
-              <a:rPr lang="en-US" sz="1050" dirty="0" smtClean="0"/>
+              <a:rPr lang="en-US" dirty="0" smtClean="0"/>
               <a:t>P</a:t>
             </a:r>
-            <a:endParaRPr lang="en-US" sz="1050" baseline="-25000" dirty="0"/>
+            <a:endParaRPr lang="en-US" baseline="-25000" dirty="0"/>
           </a:p>
         </p:txBody>
       </p:sp>
@@ -3150,7 +3150,7 @@
           <a:p>
             <a:pPr algn="ctr"/>
             <a:r>
-              <a:rPr lang="en-US" sz="1050" dirty="0" smtClean="0"/>
+              <a:rPr lang="en-US" dirty="0" smtClean="0"/>
               <a:t>A</a:t>
             </a:r>
           </a:p>
@@ -3191,10 +3191,10 @@
           <a:p>
             <a:pPr algn="ctr"/>
             <a:r>
-              <a:rPr lang="en-US" sz="1050" dirty="0" smtClean="0"/>
+              <a:rPr lang="en-US" dirty="0" smtClean="0"/>
               <a:t>Ag</a:t>
             </a:r>
-            <a:endParaRPr lang="en-US" sz="1050" dirty="0"/>
+            <a:endParaRPr lang="en-US" dirty="0"/>
           </a:p>
         </p:txBody>
       </p:sp>
@@ -3233,10 +3233,10 @@
           <a:p>
             <a:pPr algn="ctr"/>
             <a:r>
-              <a:rPr lang="en-US" sz="1050" dirty="0" smtClean="0"/>
+              <a:rPr lang="en-US" dirty="0" smtClean="0"/>
               <a:t>P</a:t>
             </a:r>
-            <a:endParaRPr lang="en-US" sz="1050" baseline="-25000" dirty="0"/>
+            <a:endParaRPr lang="en-US" baseline="-25000" dirty="0"/>
           </a:p>
         </p:txBody>
       </p:sp>
@@ -3275,7 +3275,7 @@
           <a:p>
             <a:pPr algn="ctr"/>
             <a:r>
-              <a:rPr lang="en-US" sz="1050" dirty="0" smtClean="0"/>
+              <a:rPr lang="en-US" dirty="0" smtClean="0"/>
               <a:t>A</a:t>
             </a:r>
           </a:p>
@@ -3316,10 +3316,10 @@
           <a:p>
             <a:pPr algn="ctr"/>
             <a:r>
-              <a:rPr lang="en-US" sz="1050" dirty="0" smtClean="0"/>
+              <a:rPr lang="en-US" dirty="0" smtClean="0"/>
               <a:t>P</a:t>
             </a:r>
-            <a:endParaRPr lang="en-US" sz="1050" baseline="-25000" dirty="0"/>
+            <a:endParaRPr lang="en-US" baseline="-25000" dirty="0"/>
           </a:p>
         </p:txBody>
       </p:sp>
@@ -3358,10 +3358,10 @@
           <a:p>
             <a:pPr algn="ctr"/>
             <a:r>
-              <a:rPr lang="en-US" sz="1050" dirty="0" smtClean="0"/>
+              <a:rPr lang="en-US" dirty="0" smtClean="0"/>
               <a:t>P2</a:t>
             </a:r>
-            <a:endParaRPr lang="en-US" sz="1050" baseline="-25000" dirty="0"/>
+            <a:endParaRPr lang="en-US" baseline="-25000" dirty="0"/>
           </a:p>
         </p:txBody>
       </p:sp>
@@ -3400,10 +3400,10 @@
           <a:p>
             <a:pPr algn="ctr"/>
             <a:r>
-              <a:rPr lang="en-US" sz="1050" dirty="0" smtClean="0"/>
+              <a:rPr lang="en-US" dirty="0" smtClean="0"/>
               <a:t>P1</a:t>
             </a:r>
-            <a:endParaRPr lang="en-US" sz="1050" baseline="-25000" dirty="0"/>
+            <a:endParaRPr lang="en-US" baseline="-25000" dirty="0"/>
           </a:p>
         </p:txBody>
       </p:sp>
@@ -3442,7 +3442,7 @@
           <a:p>
             <a:pPr algn="ctr"/>
             <a:r>
-              <a:rPr lang="en-US" sz="1050" dirty="0" smtClean="0"/>
+              <a:rPr lang="en-US" dirty="0" smtClean="0"/>
               <a:t>A2</a:t>
             </a:r>
           </a:p>
@@ -3483,7 +3483,7 @@
           <a:p>
             <a:pPr algn="ctr"/>
             <a:r>
-              <a:rPr lang="en-US" sz="1050" dirty="0" smtClean="0"/>
+              <a:rPr lang="en-US" dirty="0" smtClean="0"/>
               <a:t>A1</a:t>
             </a:r>
           </a:p>
@@ -7594,11 +7594,7 @@
             <a:pPr algn="ctr"/>
             <a:r>
               <a:rPr lang="en-US" sz="1050" dirty="0" smtClean="0"/>
-              <a:t>Create Edge’s </a:t>
-            </a:r>
-            <a:r>
-              <a:rPr lang="en-US" sz="1050" dirty="0" smtClean="0"/>
-              <a:t>Vertices</a:t>
+              <a:t>Create Edge’s Vertices</a:t>
             </a:r>
             <a:endParaRPr lang="en-US" sz="1050" dirty="0"/>
           </a:p>
@@ -8086,11 +8082,7 @@
             <a:pPr algn="ctr"/>
             <a:r>
               <a:rPr lang="en-US" sz="1050" dirty="0" smtClean="0"/>
-              <a:t>Add edge </a:t>
-            </a:r>
-            <a:r>
-              <a:rPr lang="en-US" sz="1050" dirty="0" smtClean="0"/>
-              <a:t>in the graph</a:t>
+              <a:t>Add edge in the graph</a:t>
             </a:r>
             <a:endParaRPr lang="en-US" sz="1050" dirty="0"/>
           </a:p>

</xml_diff>

<commit_message>
Updated cake graph (inferences) in dissertation_figures.pptx Added Esteban's revision (dissertacao_completa_v1 - Esteban.docx) Added dissertacao_completa_v2.docx
</commit_message>
<xml_diff>
--- a/Documents/Dissertacao/dissertation_figures.pptx
+++ b/Documents/Dissertacao/dissertation_figures.pptx
@@ -309,7 +309,7 @@
             <a:fld id="{331B0D56-BC31-4997-A5B4-54E7FF55EA8B}" type="datetimeFigureOut">
               <a:rPr lang="en-US" smtClean="0"/>
               <a:pPr/>
-              <a:t>7/6/2013</a:t>
+              <a:t>7/18/2013</a:t>
             </a:fld>
             <a:endParaRPr lang="en-US"/>
           </a:p>
@@ -476,7 +476,7 @@
             <a:fld id="{331B0D56-BC31-4997-A5B4-54E7FF55EA8B}" type="datetimeFigureOut">
               <a:rPr lang="en-US" smtClean="0"/>
               <a:pPr/>
-              <a:t>7/6/2013</a:t>
+              <a:t>7/18/2013</a:t>
             </a:fld>
             <a:endParaRPr lang="en-US"/>
           </a:p>
@@ -653,7 +653,7 @@
             <a:fld id="{331B0D56-BC31-4997-A5B4-54E7FF55EA8B}" type="datetimeFigureOut">
               <a:rPr lang="en-US" smtClean="0"/>
               <a:pPr/>
-              <a:t>7/6/2013</a:t>
+              <a:t>7/18/2013</a:t>
             </a:fld>
             <a:endParaRPr lang="en-US"/>
           </a:p>
@@ -820,7 +820,7 @@
             <a:fld id="{331B0D56-BC31-4997-A5B4-54E7FF55EA8B}" type="datetimeFigureOut">
               <a:rPr lang="en-US" smtClean="0"/>
               <a:pPr/>
-              <a:t>7/6/2013</a:t>
+              <a:t>7/18/2013</a:t>
             </a:fld>
             <a:endParaRPr lang="en-US"/>
           </a:p>
@@ -1063,7 +1063,7 @@
             <a:fld id="{331B0D56-BC31-4997-A5B4-54E7FF55EA8B}" type="datetimeFigureOut">
               <a:rPr lang="en-US" smtClean="0"/>
               <a:pPr/>
-              <a:t>7/6/2013</a:t>
+              <a:t>7/18/2013</a:t>
             </a:fld>
             <a:endParaRPr lang="en-US"/>
           </a:p>
@@ -1348,7 +1348,7 @@
             <a:fld id="{331B0D56-BC31-4997-A5B4-54E7FF55EA8B}" type="datetimeFigureOut">
               <a:rPr lang="en-US" smtClean="0"/>
               <a:pPr/>
-              <a:t>7/6/2013</a:t>
+              <a:t>7/18/2013</a:t>
             </a:fld>
             <a:endParaRPr lang="en-US"/>
           </a:p>
@@ -1767,7 +1767,7 @@
             <a:fld id="{331B0D56-BC31-4997-A5B4-54E7FF55EA8B}" type="datetimeFigureOut">
               <a:rPr lang="en-US" smtClean="0"/>
               <a:pPr/>
-              <a:t>7/6/2013</a:t>
+              <a:t>7/18/2013</a:t>
             </a:fld>
             <a:endParaRPr lang="en-US"/>
           </a:p>
@@ -1882,7 +1882,7 @@
             <a:fld id="{331B0D56-BC31-4997-A5B4-54E7FF55EA8B}" type="datetimeFigureOut">
               <a:rPr lang="en-US" smtClean="0"/>
               <a:pPr/>
-              <a:t>7/6/2013</a:t>
+              <a:t>7/18/2013</a:t>
             </a:fld>
             <a:endParaRPr lang="en-US"/>
           </a:p>
@@ -1974,7 +1974,7 @@
             <a:fld id="{331B0D56-BC31-4997-A5B4-54E7FF55EA8B}" type="datetimeFigureOut">
               <a:rPr lang="en-US" smtClean="0"/>
               <a:pPr/>
-              <a:t>7/6/2013</a:t>
+              <a:t>7/18/2013</a:t>
             </a:fld>
             <a:endParaRPr lang="en-US"/>
           </a:p>
@@ -2248,7 +2248,7 @@
             <a:fld id="{331B0D56-BC31-4997-A5B4-54E7FF55EA8B}" type="datetimeFigureOut">
               <a:rPr lang="en-US" smtClean="0"/>
               <a:pPr/>
-              <a:t>7/6/2013</a:t>
+              <a:t>7/18/2013</a:t>
             </a:fld>
             <a:endParaRPr lang="en-US"/>
           </a:p>
@@ -2498,7 +2498,7 @@
             <a:fld id="{331B0D56-BC31-4997-A5B4-54E7FF55EA8B}" type="datetimeFigureOut">
               <a:rPr lang="en-US" smtClean="0"/>
               <a:pPr/>
-              <a:t>7/6/2013</a:t>
+              <a:t>7/18/2013</a:t>
             </a:fld>
             <a:endParaRPr lang="en-US"/>
           </a:p>
@@ -2708,7 +2708,7 @@
             <a:fld id="{331B0D56-BC31-4997-A5B4-54E7FF55EA8B}" type="datetimeFigureOut">
               <a:rPr lang="en-US" smtClean="0"/>
               <a:pPr/>
-              <a:t>7/6/2013</a:t>
+              <a:t>7/18/2013</a:t>
             </a:fld>
             <a:endParaRPr lang="en-US"/>
           </a:p>
@@ -16451,19 +16451,20 @@
         <p:nvCxnSpPr>
           <p:cNvPr id="61" name="Elbow Connector 60"/>
           <p:cNvCxnSpPr>
-            <a:stCxn id="5" idx="0"/>
+            <a:stCxn id="147" idx="3"/>
             <a:endCxn id="8" idx="0"/>
           </p:cNvCxnSpPr>
           <p:nvPr/>
         </p:nvCxnSpPr>
         <p:spPr>
-          <a:xfrm rot="16200000" flipV="1">
-            <a:off x="3962400" y="2286000"/>
-            <a:ext cx="12700" cy="2133600"/>
-          </a:xfrm>
-          <a:prstGeom prst="bentConnector3">
+          <a:xfrm flipH="1" flipV="1">
+            <a:off x="2895600" y="3352800"/>
+            <a:ext cx="4648200" cy="381000"/>
+          </a:xfrm>
+          <a:prstGeom prst="bentConnector4">
             <a:avLst>
-              <a:gd name="adj1" fmla="val 17928006"/>
+              <a:gd name="adj1" fmla="val -4918"/>
+              <a:gd name="adj2" fmla="val 736000"/>
             </a:avLst>
           </a:prstGeom>
           <a:ln>
@@ -16494,7 +16495,7 @@
         </p:nvSpPr>
         <p:spPr>
           <a:xfrm>
-            <a:off x="3124200" y="762000"/>
+            <a:off x="3962400" y="762000"/>
             <a:ext cx="1768946" cy="369332"/>
           </a:xfrm>
           <a:prstGeom prst="rect">

</xml_diff>

<commit_message>
Updated the "Future Work" section of dissertacao_completa_v3.docx Added a new combat scenario in dissertation_figures.pptx
</commit_message>
<xml_diff>
--- a/Documents/Dissertacao/dissertation_figures.pptx
+++ b/Documents/Dissertacao/dissertation_figures.pptx
@@ -309,7 +309,7 @@
             <a:fld id="{331B0D56-BC31-4997-A5B4-54E7FF55EA8B}" type="datetimeFigureOut">
               <a:rPr lang="en-US" smtClean="0"/>
               <a:pPr/>
-              <a:t>7/18/2013</a:t>
+              <a:t>8/24/2013</a:t>
             </a:fld>
             <a:endParaRPr lang="en-US"/>
           </a:p>
@@ -476,7 +476,7 @@
             <a:fld id="{331B0D56-BC31-4997-A5B4-54E7FF55EA8B}" type="datetimeFigureOut">
               <a:rPr lang="en-US" smtClean="0"/>
               <a:pPr/>
-              <a:t>7/18/2013</a:t>
+              <a:t>8/24/2013</a:t>
             </a:fld>
             <a:endParaRPr lang="en-US"/>
           </a:p>
@@ -653,7 +653,7 @@
             <a:fld id="{331B0D56-BC31-4997-A5B4-54E7FF55EA8B}" type="datetimeFigureOut">
               <a:rPr lang="en-US" smtClean="0"/>
               <a:pPr/>
-              <a:t>7/18/2013</a:t>
+              <a:t>8/24/2013</a:t>
             </a:fld>
             <a:endParaRPr lang="en-US"/>
           </a:p>
@@ -820,7 +820,7 @@
             <a:fld id="{331B0D56-BC31-4997-A5B4-54E7FF55EA8B}" type="datetimeFigureOut">
               <a:rPr lang="en-US" smtClean="0"/>
               <a:pPr/>
-              <a:t>7/18/2013</a:t>
+              <a:t>8/24/2013</a:t>
             </a:fld>
             <a:endParaRPr lang="en-US"/>
           </a:p>
@@ -1063,7 +1063,7 @@
             <a:fld id="{331B0D56-BC31-4997-A5B4-54E7FF55EA8B}" type="datetimeFigureOut">
               <a:rPr lang="en-US" smtClean="0"/>
               <a:pPr/>
-              <a:t>7/18/2013</a:t>
+              <a:t>8/24/2013</a:t>
             </a:fld>
             <a:endParaRPr lang="en-US"/>
           </a:p>
@@ -1348,7 +1348,7 @@
             <a:fld id="{331B0D56-BC31-4997-A5B4-54E7FF55EA8B}" type="datetimeFigureOut">
               <a:rPr lang="en-US" smtClean="0"/>
               <a:pPr/>
-              <a:t>7/18/2013</a:t>
+              <a:t>8/24/2013</a:t>
             </a:fld>
             <a:endParaRPr lang="en-US"/>
           </a:p>
@@ -1767,7 +1767,7 @@
             <a:fld id="{331B0D56-BC31-4997-A5B4-54E7FF55EA8B}" type="datetimeFigureOut">
               <a:rPr lang="en-US" smtClean="0"/>
               <a:pPr/>
-              <a:t>7/18/2013</a:t>
+              <a:t>8/24/2013</a:t>
             </a:fld>
             <a:endParaRPr lang="en-US"/>
           </a:p>
@@ -1882,7 +1882,7 @@
             <a:fld id="{331B0D56-BC31-4997-A5B4-54E7FF55EA8B}" type="datetimeFigureOut">
               <a:rPr lang="en-US" smtClean="0"/>
               <a:pPr/>
-              <a:t>7/18/2013</a:t>
+              <a:t>8/24/2013</a:t>
             </a:fld>
             <a:endParaRPr lang="en-US"/>
           </a:p>
@@ -1974,7 +1974,7 @@
             <a:fld id="{331B0D56-BC31-4997-A5B4-54E7FF55EA8B}" type="datetimeFigureOut">
               <a:rPr lang="en-US" smtClean="0"/>
               <a:pPr/>
-              <a:t>7/18/2013</a:t>
+              <a:t>8/24/2013</a:t>
             </a:fld>
             <a:endParaRPr lang="en-US"/>
           </a:p>
@@ -2248,7 +2248,7 @@
             <a:fld id="{331B0D56-BC31-4997-A5B4-54E7FF55EA8B}" type="datetimeFigureOut">
               <a:rPr lang="en-US" smtClean="0"/>
               <a:pPr/>
-              <a:t>7/18/2013</a:t>
+              <a:t>8/24/2013</a:t>
             </a:fld>
             <a:endParaRPr lang="en-US"/>
           </a:p>
@@ -2498,7 +2498,7 @@
             <a:fld id="{331B0D56-BC31-4997-A5B4-54E7FF55EA8B}" type="datetimeFigureOut">
               <a:rPr lang="en-US" smtClean="0"/>
               <a:pPr/>
-              <a:t>7/18/2013</a:t>
+              <a:t>8/24/2013</a:t>
             </a:fld>
             <a:endParaRPr lang="en-US"/>
           </a:p>
@@ -2708,7 +2708,7 @@
             <a:fld id="{331B0D56-BC31-4997-A5B4-54E7FF55EA8B}" type="datetimeFigureOut">
               <a:rPr lang="en-US" smtClean="0"/>
               <a:pPr/>
-              <a:t>7/18/2013</a:t>
+              <a:t>8/24/2013</a:t>
             </a:fld>
             <a:endParaRPr lang="en-US"/>
           </a:p>
@@ -12414,7 +12414,15 @@
             <a:pPr algn="ctr"/>
             <a:r>
               <a:rPr lang="en-US" sz="1050" dirty="0" smtClean="0"/>
-              <a:t>Game Flow Log</a:t>
+              <a:t>Game </a:t>
+            </a:r>
+            <a:r>
+              <a:rPr lang="en-US" sz="1050" dirty="0" smtClean="0"/>
+              <a:t>Flux </a:t>
+            </a:r>
+            <a:r>
+              <a:rPr lang="en-US" sz="1050" dirty="0" smtClean="0"/>
+              <a:t>Log</a:t>
             </a:r>
             <a:endParaRPr lang="en-US" sz="1050" dirty="0"/>
           </a:p>

</xml_diff>